<commit_message>
Cart - 9 - Total for products
</commit_message>
<xml_diff>
--- a/_presentation/prezentare_aplicatie.pptx
+++ b/_presentation/prezentare_aplicatie.pptx
@@ -27,6 +27,7 @@
     <p:sldId id="273" r:id="rId21"/>
     <p:sldId id="274" r:id="rId22"/>
     <p:sldId id="275" r:id="rId23"/>
+    <p:sldId id="276" r:id="rId24"/>
   </p:sldIdLst>
   <p:sldSz cx="12192000" cy="6858000"/>
   <p:notesSz cx="6858000" cy="9144000"/>
@@ -283,9 +284,9 @@
             <a:fld id="{87DE6118-2437-4B30-8E3C-4D2BE6020583}" type="datetimeFigureOut">
               <a:rPr lang="en-US" smtClean="0"/>
               <a:pPr/>
-              <a:t>2/13/2022</a:t>
+              <a:t>3/21/2022</a:t>
             </a:fld>
-            <a:endParaRPr lang="en-US" dirty="0"/>
+            <a:endParaRPr lang="en-US"/>
           </a:p>
         </p:txBody>
       </p:sp>
@@ -310,7 +311,7 @@
           <a:bodyPr/>
           <a:lstStyle/>
           <a:p>
-            <a:endParaRPr lang="en-US" dirty="0"/>
+            <a:endParaRPr lang="en-US"/>
           </a:p>
         </p:txBody>
       </p:sp>
@@ -340,7 +341,7 @@
               <a:pPr/>
               <a:t>‹#›</a:t>
             </a:fld>
-            <a:endParaRPr lang="en-US" dirty="0"/>
+            <a:endParaRPr lang="en-US"/>
           </a:p>
         </p:txBody>
       </p:sp>
@@ -484,9 +485,9 @@
           <a:p>
             <a:fld id="{87DE6118-2437-4B30-8E3C-4D2BE6020583}" type="datetimeFigureOut">
               <a:rPr lang="en-US" smtClean="0"/>
-              <a:t>2/13/2022</a:t>
+              <a:t>3/21/2022</a:t>
             </a:fld>
-            <a:endParaRPr lang="en-US" dirty="0"/>
+            <a:endParaRPr lang="en-US"/>
           </a:p>
         </p:txBody>
       </p:sp>
@@ -511,7 +512,7 @@
           <a:bodyPr/>
           <a:lstStyle/>
           <a:p>
-            <a:endParaRPr lang="en-US" dirty="0"/>
+            <a:endParaRPr lang="en-US"/>
           </a:p>
         </p:txBody>
       </p:sp>
@@ -540,7 +541,7 @@
               <a:rPr lang="en-US" smtClean="0"/>
               <a:t>‹#›</a:t>
             </a:fld>
-            <a:endParaRPr lang="en-US" dirty="0"/>
+            <a:endParaRPr lang="en-US"/>
           </a:p>
         </p:txBody>
       </p:sp>
@@ -694,9 +695,9 @@
           <a:p>
             <a:fld id="{87DE6118-2437-4B30-8E3C-4D2BE6020583}" type="datetimeFigureOut">
               <a:rPr lang="en-US" smtClean="0"/>
-              <a:t>2/13/2022</a:t>
+              <a:t>3/21/2022</a:t>
             </a:fld>
-            <a:endParaRPr lang="en-US" dirty="0"/>
+            <a:endParaRPr lang="en-US"/>
           </a:p>
         </p:txBody>
       </p:sp>
@@ -721,7 +722,7 @@
           <a:bodyPr/>
           <a:lstStyle/>
           <a:p>
-            <a:endParaRPr lang="en-US" dirty="0"/>
+            <a:endParaRPr lang="en-US"/>
           </a:p>
         </p:txBody>
       </p:sp>
@@ -750,7 +751,7 @@
               <a:rPr lang="en-US" smtClean="0"/>
               <a:t>‹#›</a:t>
             </a:fld>
-            <a:endParaRPr lang="en-US" dirty="0"/>
+            <a:endParaRPr lang="en-US"/>
           </a:p>
         </p:txBody>
       </p:sp>
@@ -907,9 +908,9 @@
             <a:fld id="{87DE6118-2437-4B30-8E3C-4D2BE6020583}" type="datetimeFigureOut">
               <a:rPr lang="en-US" smtClean="0"/>
               <a:pPr/>
-              <a:t>2/13/2022</a:t>
+              <a:t>3/21/2022</a:t>
             </a:fld>
-            <a:endParaRPr lang="en-US" dirty="0"/>
+            <a:endParaRPr lang="en-US"/>
           </a:p>
         </p:txBody>
       </p:sp>
@@ -933,7 +934,7 @@
           <a:bodyPr/>
           <a:lstStyle/>
           <a:p>
-            <a:endParaRPr lang="en-US" dirty="0"/>
+            <a:endParaRPr lang="en-US"/>
           </a:p>
         </p:txBody>
       </p:sp>
@@ -962,7 +963,7 @@
               <a:pPr/>
               <a:t>‹#›</a:t>
             </a:fld>
-            <a:endParaRPr lang="en-US" dirty="0"/>
+            <a:endParaRPr lang="en-US"/>
           </a:p>
         </p:txBody>
       </p:sp>
@@ -1119,9 +1120,9 @@
           <a:p>
             <a:fld id="{87DE6118-2437-4B30-8E3C-4D2BE6020583}" type="datetimeFigureOut">
               <a:rPr lang="en-US" smtClean="0"/>
-              <a:t>2/13/2022</a:t>
+              <a:t>3/21/2022</a:t>
             </a:fld>
-            <a:endParaRPr lang="en-US" dirty="0"/>
+            <a:endParaRPr lang="en-US"/>
           </a:p>
         </p:txBody>
       </p:sp>
@@ -1140,7 +1141,7 @@
           <a:bodyPr/>
           <a:lstStyle/>
           <a:p>
-            <a:endParaRPr lang="en-US" dirty="0"/>
+            <a:endParaRPr lang="en-US"/>
           </a:p>
         </p:txBody>
       </p:sp>
@@ -1163,7 +1164,7 @@
               <a:rPr lang="en-US" smtClean="0"/>
               <a:t>‹#›</a:t>
             </a:fld>
-            <a:endParaRPr lang="en-US" dirty="0"/>
+            <a:endParaRPr lang="en-US"/>
           </a:p>
         </p:txBody>
       </p:sp>
@@ -1399,9 +1400,9 @@
             <a:fld id="{87DE6118-2437-4B30-8E3C-4D2BE6020583}" type="datetimeFigureOut">
               <a:rPr lang="en-US" smtClean="0"/>
               <a:pPr/>
-              <a:t>2/13/2022</a:t>
+              <a:t>3/21/2022</a:t>
             </a:fld>
-            <a:endParaRPr lang="en-US" dirty="0"/>
+            <a:endParaRPr lang="en-US"/>
           </a:p>
         </p:txBody>
       </p:sp>
@@ -1420,7 +1421,7 @@
           <a:bodyPr/>
           <a:lstStyle/>
           <a:p>
-            <a:endParaRPr lang="en-US" dirty="0"/>
+            <a:endParaRPr lang="en-US"/>
           </a:p>
         </p:txBody>
       </p:sp>
@@ -1444,7 +1445,7 @@
               <a:pPr/>
               <a:t>‹#›</a:t>
             </a:fld>
-            <a:endParaRPr lang="en-US" dirty="0"/>
+            <a:endParaRPr lang="en-US"/>
           </a:p>
         </p:txBody>
       </p:sp>
@@ -1668,9 +1669,9 @@
           <a:p>
             <a:fld id="{87DE6118-2437-4B30-8E3C-4D2BE6020583}" type="datetimeFigureOut">
               <a:rPr lang="en-US" smtClean="0"/>
-              <a:t>2/13/2022</a:t>
+              <a:t>3/21/2022</a:t>
             </a:fld>
-            <a:endParaRPr lang="en-US" dirty="0"/>
+            <a:endParaRPr lang="en-US"/>
           </a:p>
         </p:txBody>
       </p:sp>
@@ -1689,7 +1690,7 @@
           <a:bodyPr/>
           <a:lstStyle/>
           <a:p>
-            <a:endParaRPr lang="en-US" dirty="0"/>
+            <a:endParaRPr lang="en-US"/>
           </a:p>
         </p:txBody>
       </p:sp>
@@ -1712,7 +1713,7 @@
               <a:rPr lang="en-US" smtClean="0"/>
               <a:t>‹#›</a:t>
             </a:fld>
-            <a:endParaRPr lang="en-US" dirty="0"/>
+            <a:endParaRPr lang="en-US"/>
           </a:p>
         </p:txBody>
       </p:sp>
@@ -2084,9 +2085,9 @@
           <a:p>
             <a:fld id="{87DE6118-2437-4B30-8E3C-4D2BE6020583}" type="datetimeFigureOut">
               <a:rPr lang="en-US" smtClean="0"/>
-              <a:t>2/13/2022</a:t>
+              <a:t>3/21/2022</a:t>
             </a:fld>
-            <a:endParaRPr lang="en-US" dirty="0"/>
+            <a:endParaRPr lang="en-US"/>
           </a:p>
         </p:txBody>
       </p:sp>
@@ -2105,7 +2106,7 @@
           <a:bodyPr/>
           <a:lstStyle/>
           <a:p>
-            <a:endParaRPr lang="en-US" dirty="0"/>
+            <a:endParaRPr lang="en-US"/>
           </a:p>
         </p:txBody>
       </p:sp>
@@ -2128,7 +2129,7 @@
               <a:rPr lang="en-US" smtClean="0"/>
               <a:t>‹#›</a:t>
             </a:fld>
-            <a:endParaRPr lang="en-US" dirty="0"/>
+            <a:endParaRPr lang="en-US"/>
           </a:p>
         </p:txBody>
       </p:sp>
@@ -2233,9 +2234,9 @@
           <a:p>
             <a:fld id="{87DE6118-2437-4B30-8E3C-4D2BE6020583}" type="datetimeFigureOut">
               <a:rPr lang="en-US" smtClean="0"/>
-              <a:t>2/13/2022</a:t>
+              <a:t>3/21/2022</a:t>
             </a:fld>
-            <a:endParaRPr lang="en-US" dirty="0"/>
+            <a:endParaRPr lang="en-US"/>
           </a:p>
         </p:txBody>
       </p:sp>
@@ -2254,7 +2255,7 @@
           <a:bodyPr/>
           <a:lstStyle/>
           <a:p>
-            <a:endParaRPr lang="en-US" dirty="0"/>
+            <a:endParaRPr lang="en-US"/>
           </a:p>
         </p:txBody>
       </p:sp>
@@ -2277,7 +2278,7 @@
               <a:rPr lang="en-US" smtClean="0"/>
               <a:t>‹#›</a:t>
             </a:fld>
-            <a:endParaRPr lang="en-US" dirty="0"/>
+            <a:endParaRPr lang="en-US"/>
           </a:p>
         </p:txBody>
       </p:sp>
@@ -2359,9 +2360,9 @@
           <a:p>
             <a:fld id="{87DE6118-2437-4B30-8E3C-4D2BE6020583}" type="datetimeFigureOut">
               <a:rPr lang="en-US" smtClean="0"/>
-              <a:t>2/13/2022</a:t>
+              <a:t>3/21/2022</a:t>
             </a:fld>
-            <a:endParaRPr lang="en-US" dirty="0"/>
+            <a:endParaRPr lang="en-US"/>
           </a:p>
         </p:txBody>
       </p:sp>
@@ -2380,7 +2381,7 @@
           <a:bodyPr/>
           <a:lstStyle/>
           <a:p>
-            <a:endParaRPr lang="en-US" dirty="0"/>
+            <a:endParaRPr lang="en-US"/>
           </a:p>
         </p:txBody>
       </p:sp>
@@ -2403,7 +2404,7 @@
               <a:rPr lang="en-US" smtClean="0"/>
               <a:t>‹#›</a:t>
             </a:fld>
-            <a:endParaRPr lang="en-US" dirty="0"/>
+            <a:endParaRPr lang="en-US"/>
           </a:p>
         </p:txBody>
       </p:sp>
@@ -2611,9 +2612,9 @@
             <a:fld id="{87DE6118-2437-4B30-8E3C-4D2BE6020583}" type="datetimeFigureOut">
               <a:rPr lang="en-US" smtClean="0"/>
               <a:pPr/>
-              <a:t>2/13/2022</a:t>
+              <a:t>3/21/2022</a:t>
             </a:fld>
-            <a:endParaRPr lang="en-US" dirty="0"/>
+            <a:endParaRPr lang="en-US"/>
           </a:p>
         </p:txBody>
       </p:sp>
@@ -2632,7 +2633,7 @@
           <a:bodyPr/>
           <a:lstStyle/>
           <a:p>
-            <a:endParaRPr lang="en-US" dirty="0"/>
+            <a:endParaRPr lang="en-US"/>
           </a:p>
         </p:txBody>
       </p:sp>
@@ -2656,7 +2657,7 @@
               <a:pPr/>
               <a:t>‹#›</a:t>
             </a:fld>
-            <a:endParaRPr lang="en-US" dirty="0"/>
+            <a:endParaRPr lang="en-US"/>
           </a:p>
         </p:txBody>
       </p:sp>
@@ -2831,9 +2832,9 @@
           <a:p>
             <a:fld id="{87DE6118-2437-4B30-8E3C-4D2BE6020583}" type="datetimeFigureOut">
               <a:rPr lang="en-US" smtClean="0"/>
-              <a:t>2/13/2022</a:t>
+              <a:t>3/21/2022</a:t>
             </a:fld>
-            <a:endParaRPr lang="en-US" dirty="0"/>
+            <a:endParaRPr lang="en-US"/>
           </a:p>
         </p:txBody>
       </p:sp>
@@ -2858,7 +2859,7 @@
           <a:bodyPr/>
           <a:lstStyle/>
           <a:p>
-            <a:endParaRPr lang="en-US" dirty="0"/>
+            <a:endParaRPr lang="en-US"/>
           </a:p>
         </p:txBody>
       </p:sp>
@@ -2887,7 +2888,7 @@
               <a:rPr lang="en-US" smtClean="0"/>
               <a:t>‹#›</a:t>
             </a:fld>
-            <a:endParaRPr lang="en-US" dirty="0"/>
+            <a:endParaRPr lang="en-US"/>
           </a:p>
         </p:txBody>
       </p:sp>
@@ -3160,7 +3161,6 @@
               <a:rPr lang="en-US"/>
               <a:t>Click icon to add picture</a:t>
             </a:r>
-            <a:endParaRPr lang="en-US" dirty="0"/>
           </a:p>
         </p:txBody>
       </p:sp>
@@ -3258,9 +3258,9 @@
             <a:fld id="{87DE6118-2437-4B30-8E3C-4D2BE6020583}" type="datetimeFigureOut">
               <a:rPr lang="en-US" smtClean="0"/>
               <a:pPr/>
-              <a:t>2/13/2022</a:t>
+              <a:t>3/21/2022</a:t>
             </a:fld>
-            <a:endParaRPr lang="en-US" dirty="0"/>
+            <a:endParaRPr lang="en-US"/>
           </a:p>
         </p:txBody>
       </p:sp>
@@ -3284,7 +3284,7 @@
           <a:bodyPr/>
           <a:lstStyle/>
           <a:p>
-            <a:endParaRPr lang="en-US" dirty="0"/>
+            <a:endParaRPr lang="en-US"/>
           </a:p>
         </p:txBody>
       </p:sp>
@@ -3308,7 +3308,7 @@
               <a:pPr/>
               <a:t>‹#›</a:t>
             </a:fld>
-            <a:endParaRPr lang="en-US" dirty="0"/>
+            <a:endParaRPr lang="en-US"/>
           </a:p>
         </p:txBody>
       </p:sp>
@@ -3465,9 +3465,9 @@
           <a:p>
             <a:fld id="{87DE6118-2437-4B30-8E3C-4D2BE6020583}" type="datetimeFigureOut">
               <a:rPr lang="en-US" smtClean="0"/>
-              <a:t>2/13/2022</a:t>
+              <a:t>3/21/2022</a:t>
             </a:fld>
-            <a:endParaRPr lang="en-US" dirty="0"/>
+            <a:endParaRPr lang="en-US"/>
           </a:p>
         </p:txBody>
       </p:sp>
@@ -3486,7 +3486,7 @@
           <a:bodyPr/>
           <a:lstStyle/>
           <a:p>
-            <a:endParaRPr lang="en-US" dirty="0"/>
+            <a:endParaRPr lang="en-US"/>
           </a:p>
         </p:txBody>
       </p:sp>
@@ -3509,7 +3509,7 @@
               <a:rPr lang="en-US" smtClean="0"/>
               <a:t>‹#›</a:t>
             </a:fld>
-            <a:endParaRPr lang="en-US" dirty="0"/>
+            <a:endParaRPr lang="en-US"/>
           </a:p>
         </p:txBody>
       </p:sp>
@@ -3680,9 +3680,9 @@
           <a:p>
             <a:fld id="{87DE6118-2437-4B30-8E3C-4D2BE6020583}" type="datetimeFigureOut">
               <a:rPr lang="en-US" smtClean="0"/>
-              <a:t>2/13/2022</a:t>
+              <a:t>3/21/2022</a:t>
             </a:fld>
-            <a:endParaRPr lang="en-US" dirty="0"/>
+            <a:endParaRPr lang="en-US"/>
           </a:p>
         </p:txBody>
       </p:sp>
@@ -3701,7 +3701,7 @@
           <a:bodyPr/>
           <a:lstStyle/>
           <a:p>
-            <a:endParaRPr lang="en-US" dirty="0"/>
+            <a:endParaRPr lang="en-US"/>
           </a:p>
         </p:txBody>
       </p:sp>
@@ -3724,7 +3724,7 @@
               <a:rPr lang="en-US" smtClean="0"/>
               <a:t>‹#›</a:t>
             </a:fld>
-            <a:endParaRPr lang="en-US" dirty="0"/>
+            <a:endParaRPr lang="en-US"/>
           </a:p>
         </p:txBody>
       </p:sp>
@@ -3922,9 +3922,9 @@
             <a:fld id="{87DE6118-2437-4B30-8E3C-4D2BE6020583}" type="datetimeFigureOut">
               <a:rPr lang="en-US" smtClean="0"/>
               <a:pPr/>
-              <a:t>2/13/2022</a:t>
+              <a:t>3/21/2022</a:t>
             </a:fld>
-            <a:endParaRPr lang="en-US" dirty="0"/>
+            <a:endParaRPr lang="en-US"/>
           </a:p>
         </p:txBody>
       </p:sp>
@@ -3949,7 +3949,7 @@
           <a:bodyPr/>
           <a:lstStyle/>
           <a:p>
-            <a:endParaRPr lang="en-US" dirty="0"/>
+            <a:endParaRPr lang="en-US"/>
           </a:p>
         </p:txBody>
       </p:sp>
@@ -3979,7 +3979,7 @@
               <a:pPr/>
               <a:t>‹#›</a:t>
             </a:fld>
-            <a:endParaRPr lang="en-US" dirty="0"/>
+            <a:endParaRPr lang="en-US"/>
           </a:p>
         </p:txBody>
       </p:sp>
@@ -4123,9 +4123,9 @@
           <a:p>
             <a:fld id="{87DE6118-2437-4B30-8E3C-4D2BE6020583}" type="datetimeFigureOut">
               <a:rPr lang="en-US" smtClean="0"/>
-              <a:t>2/13/2022</a:t>
+              <a:t>3/21/2022</a:t>
             </a:fld>
-            <a:endParaRPr lang="en-US" dirty="0"/>
+            <a:endParaRPr lang="en-US"/>
           </a:p>
         </p:txBody>
       </p:sp>
@@ -4150,7 +4150,7 @@
           <a:bodyPr/>
           <a:lstStyle/>
           <a:p>
-            <a:endParaRPr lang="en-US" dirty="0"/>
+            <a:endParaRPr lang="en-US"/>
           </a:p>
         </p:txBody>
       </p:sp>
@@ -4179,7 +4179,7 @@
               <a:rPr lang="en-US" smtClean="0"/>
               <a:t>‹#›</a:t>
             </a:fld>
-            <a:endParaRPr lang="en-US" dirty="0"/>
+            <a:endParaRPr lang="en-US"/>
           </a:p>
         </p:txBody>
       </p:sp>
@@ -4400,9 +4400,9 @@
             <a:fld id="{87DE6118-2437-4B30-8E3C-4D2BE6020583}" type="datetimeFigureOut">
               <a:rPr lang="en-US" smtClean="0"/>
               <a:pPr/>
-              <a:t>2/13/2022</a:t>
+              <a:t>3/21/2022</a:t>
             </a:fld>
-            <a:endParaRPr lang="en-US" dirty="0"/>
+            <a:endParaRPr lang="en-US"/>
           </a:p>
         </p:txBody>
       </p:sp>
@@ -4427,7 +4427,7 @@
           <a:bodyPr/>
           <a:lstStyle/>
           <a:p>
-            <a:endParaRPr lang="en-US" dirty="0"/>
+            <a:endParaRPr lang="en-US"/>
           </a:p>
         </p:txBody>
       </p:sp>
@@ -4457,7 +4457,7 @@
               <a:pPr/>
               <a:t>‹#›</a:t>
             </a:fld>
-            <a:endParaRPr lang="en-US" dirty="0"/>
+            <a:endParaRPr lang="en-US"/>
           </a:p>
         </p:txBody>
       </p:sp>
@@ -4669,9 +4669,9 @@
           <a:p>
             <a:fld id="{87DE6118-2437-4B30-8E3C-4D2BE6020583}" type="datetimeFigureOut">
               <a:rPr lang="en-US" smtClean="0"/>
-              <a:t>2/13/2022</a:t>
+              <a:t>3/21/2022</a:t>
             </a:fld>
-            <a:endParaRPr lang="en-US" dirty="0"/>
+            <a:endParaRPr lang="en-US"/>
           </a:p>
         </p:txBody>
       </p:sp>
@@ -4696,7 +4696,7 @@
           <a:bodyPr/>
           <a:lstStyle/>
           <a:p>
-            <a:endParaRPr lang="en-US" dirty="0"/>
+            <a:endParaRPr lang="en-US"/>
           </a:p>
         </p:txBody>
       </p:sp>
@@ -4725,7 +4725,7 @@
               <a:rPr lang="en-US" smtClean="0"/>
               <a:t>‹#›</a:t>
             </a:fld>
-            <a:endParaRPr lang="en-US" dirty="0"/>
+            <a:endParaRPr lang="en-US"/>
           </a:p>
         </p:txBody>
       </p:sp>
@@ -5084,9 +5084,9 @@
           <a:p>
             <a:fld id="{87DE6118-2437-4B30-8E3C-4D2BE6020583}" type="datetimeFigureOut">
               <a:rPr lang="en-US" smtClean="0"/>
-              <a:t>2/13/2022</a:t>
+              <a:t>3/21/2022</a:t>
             </a:fld>
-            <a:endParaRPr lang="en-US" dirty="0"/>
+            <a:endParaRPr lang="en-US"/>
           </a:p>
         </p:txBody>
       </p:sp>
@@ -5111,7 +5111,7 @@
           <a:bodyPr/>
           <a:lstStyle/>
           <a:p>
-            <a:endParaRPr lang="en-US" dirty="0"/>
+            <a:endParaRPr lang="en-US"/>
           </a:p>
         </p:txBody>
       </p:sp>
@@ -5140,7 +5140,7 @@
               <a:rPr lang="en-US" smtClean="0"/>
               <a:t>‹#›</a:t>
             </a:fld>
-            <a:endParaRPr lang="en-US" dirty="0"/>
+            <a:endParaRPr lang="en-US"/>
           </a:p>
         </p:txBody>
       </p:sp>
@@ -5226,9 +5226,9 @@
           <a:p>
             <a:fld id="{87DE6118-2437-4B30-8E3C-4D2BE6020583}" type="datetimeFigureOut">
               <a:rPr lang="en-US" smtClean="0"/>
-              <a:t>2/13/2022</a:t>
+              <a:t>3/21/2022</a:t>
             </a:fld>
-            <a:endParaRPr lang="en-US" dirty="0"/>
+            <a:endParaRPr lang="en-US"/>
           </a:p>
         </p:txBody>
       </p:sp>
@@ -5253,7 +5253,7 @@
           <a:bodyPr/>
           <a:lstStyle/>
           <a:p>
-            <a:endParaRPr lang="en-US" dirty="0"/>
+            <a:endParaRPr lang="en-US"/>
           </a:p>
         </p:txBody>
       </p:sp>
@@ -5282,7 +5282,7 @@
               <a:rPr lang="en-US" smtClean="0"/>
               <a:t>‹#›</a:t>
             </a:fld>
-            <a:endParaRPr lang="en-US" dirty="0"/>
+            <a:endParaRPr lang="en-US"/>
           </a:p>
         </p:txBody>
       </p:sp>
@@ -5339,9 +5339,9 @@
           <a:p>
             <a:fld id="{87DE6118-2437-4B30-8E3C-4D2BE6020583}" type="datetimeFigureOut">
               <a:rPr lang="en-US" smtClean="0"/>
-              <a:t>2/13/2022</a:t>
+              <a:t>3/21/2022</a:t>
             </a:fld>
-            <a:endParaRPr lang="en-US" dirty="0"/>
+            <a:endParaRPr lang="en-US"/>
           </a:p>
         </p:txBody>
       </p:sp>
@@ -5366,7 +5366,7 @@
           <a:bodyPr/>
           <a:lstStyle/>
           <a:p>
-            <a:endParaRPr lang="en-US" dirty="0"/>
+            <a:endParaRPr lang="en-US"/>
           </a:p>
         </p:txBody>
       </p:sp>
@@ -5395,7 +5395,7 @@
               <a:rPr lang="en-US" smtClean="0"/>
               <a:t>‹#›</a:t>
             </a:fld>
-            <a:endParaRPr lang="en-US" dirty="0"/>
+            <a:endParaRPr lang="en-US"/>
           </a:p>
         </p:txBody>
       </p:sp>
@@ -5616,9 +5616,9 @@
             <a:fld id="{87DE6118-2437-4B30-8E3C-4D2BE6020583}" type="datetimeFigureOut">
               <a:rPr lang="en-US" smtClean="0"/>
               <a:pPr/>
-              <a:t>2/13/2022</a:t>
+              <a:t>3/21/2022</a:t>
             </a:fld>
-            <a:endParaRPr lang="en-US" dirty="0"/>
+            <a:endParaRPr lang="en-US"/>
           </a:p>
         </p:txBody>
       </p:sp>
@@ -5643,7 +5643,7 @@
           <a:bodyPr/>
           <a:lstStyle/>
           <a:p>
-            <a:endParaRPr lang="en-US" dirty="0"/>
+            <a:endParaRPr lang="en-US"/>
           </a:p>
         </p:txBody>
       </p:sp>
@@ -5673,7 +5673,7 @@
               <a:pPr/>
               <a:t>‹#›</a:t>
             </a:fld>
-            <a:endParaRPr lang="en-US" dirty="0"/>
+            <a:endParaRPr lang="en-US"/>
           </a:p>
         </p:txBody>
       </p:sp>
@@ -5931,9 +5931,9 @@
             <a:fld id="{87DE6118-2437-4B30-8E3C-4D2BE6020583}" type="datetimeFigureOut">
               <a:rPr lang="en-US" smtClean="0"/>
               <a:pPr/>
-              <a:t>2/13/2022</a:t>
+              <a:t>3/21/2022</a:t>
             </a:fld>
-            <a:endParaRPr lang="en-US" dirty="0"/>
+            <a:endParaRPr lang="en-US"/>
           </a:p>
         </p:txBody>
       </p:sp>
@@ -5958,7 +5958,7 @@
           <a:bodyPr/>
           <a:lstStyle/>
           <a:p>
-            <a:endParaRPr lang="en-US" dirty="0"/>
+            <a:endParaRPr lang="en-US"/>
           </a:p>
         </p:txBody>
       </p:sp>
@@ -5988,7 +5988,7 @@
               <a:pPr/>
               <a:t>‹#›</a:t>
             </a:fld>
-            <a:endParaRPr lang="en-US" dirty="0"/>
+            <a:endParaRPr lang="en-US"/>
           </a:p>
         </p:txBody>
       </p:sp>
@@ -6222,9 +6222,9 @@
             <a:fld id="{87DE6118-2437-4B30-8E3C-4D2BE6020583}" type="datetimeFigureOut">
               <a:rPr lang="en-US" smtClean="0"/>
               <a:pPr/>
-              <a:t>2/13/2022</a:t>
+              <a:t>3/21/2022</a:t>
             </a:fld>
-            <a:endParaRPr lang="en-US" dirty="0"/>
+            <a:endParaRPr lang="en-US"/>
           </a:p>
         </p:txBody>
       </p:sp>
@@ -6249,7 +6249,7 @@
           <a:bodyPr/>
           <a:lstStyle/>
           <a:p>
-            <a:endParaRPr lang="en-US" dirty="0"/>
+            <a:endParaRPr lang="en-US"/>
           </a:p>
         </p:txBody>
       </p:sp>
@@ -6279,7 +6279,7 @@
               <a:pPr/>
               <a:t>‹#›</a:t>
             </a:fld>
-            <a:endParaRPr lang="en-US" dirty="0"/>
+            <a:endParaRPr lang="en-US"/>
           </a:p>
         </p:txBody>
       </p:sp>
@@ -6423,9 +6423,9 @@
           <a:p>
             <a:fld id="{87DE6118-2437-4B30-8E3C-4D2BE6020583}" type="datetimeFigureOut">
               <a:rPr lang="en-US" smtClean="0"/>
-              <a:t>2/13/2022</a:t>
+              <a:t>3/21/2022</a:t>
             </a:fld>
-            <a:endParaRPr lang="en-US" dirty="0"/>
+            <a:endParaRPr lang="en-US"/>
           </a:p>
         </p:txBody>
       </p:sp>
@@ -6450,7 +6450,7 @@
           <a:bodyPr/>
           <a:lstStyle/>
           <a:p>
-            <a:endParaRPr lang="en-US" dirty="0"/>
+            <a:endParaRPr lang="en-US"/>
           </a:p>
         </p:txBody>
       </p:sp>
@@ -6479,7 +6479,7 @@
               <a:rPr lang="en-US" smtClean="0"/>
               <a:t>‹#›</a:t>
             </a:fld>
-            <a:endParaRPr lang="en-US" dirty="0"/>
+            <a:endParaRPr lang="en-US"/>
           </a:p>
         </p:txBody>
       </p:sp>
@@ -6633,9 +6633,9 @@
           <a:p>
             <a:fld id="{87DE6118-2437-4B30-8E3C-4D2BE6020583}" type="datetimeFigureOut">
               <a:rPr lang="en-US" smtClean="0"/>
-              <a:t>2/13/2022</a:t>
+              <a:t>3/21/2022</a:t>
             </a:fld>
-            <a:endParaRPr lang="en-US" dirty="0"/>
+            <a:endParaRPr lang="en-US"/>
           </a:p>
         </p:txBody>
       </p:sp>
@@ -6660,7 +6660,7 @@
           <a:bodyPr/>
           <a:lstStyle/>
           <a:p>
-            <a:endParaRPr lang="en-US" dirty="0"/>
+            <a:endParaRPr lang="en-US"/>
           </a:p>
         </p:txBody>
       </p:sp>
@@ -6689,7 +6689,7 @@
               <a:rPr lang="en-US" smtClean="0"/>
               <a:t>‹#›</a:t>
             </a:fld>
-            <a:endParaRPr lang="en-US" dirty="0"/>
+            <a:endParaRPr lang="en-US"/>
           </a:p>
         </p:txBody>
       </p:sp>
@@ -6901,9 +6901,9 @@
           <a:p>
             <a:fld id="{87DE6118-2437-4B30-8E3C-4D2BE6020583}" type="datetimeFigureOut">
               <a:rPr lang="en-US" smtClean="0"/>
-              <a:t>2/13/2022</a:t>
+              <a:t>3/21/2022</a:t>
             </a:fld>
-            <a:endParaRPr lang="en-US" dirty="0"/>
+            <a:endParaRPr lang="en-US"/>
           </a:p>
         </p:txBody>
       </p:sp>
@@ -6928,7 +6928,7 @@
           <a:bodyPr/>
           <a:lstStyle/>
           <a:p>
-            <a:endParaRPr lang="en-US" dirty="0"/>
+            <a:endParaRPr lang="en-US"/>
           </a:p>
         </p:txBody>
       </p:sp>
@@ -6957,7 +6957,7 @@
               <a:rPr lang="en-US" smtClean="0"/>
               <a:t>‹#›</a:t>
             </a:fld>
-            <a:endParaRPr lang="en-US" dirty="0"/>
+            <a:endParaRPr lang="en-US"/>
           </a:p>
         </p:txBody>
       </p:sp>
@@ -7316,9 +7316,9 @@
           <a:p>
             <a:fld id="{87DE6118-2437-4B30-8E3C-4D2BE6020583}" type="datetimeFigureOut">
               <a:rPr lang="en-US" smtClean="0"/>
-              <a:t>2/13/2022</a:t>
+              <a:t>3/21/2022</a:t>
             </a:fld>
-            <a:endParaRPr lang="en-US" dirty="0"/>
+            <a:endParaRPr lang="en-US"/>
           </a:p>
         </p:txBody>
       </p:sp>
@@ -7343,7 +7343,7 @@
           <a:bodyPr/>
           <a:lstStyle/>
           <a:p>
-            <a:endParaRPr lang="en-US" dirty="0"/>
+            <a:endParaRPr lang="en-US"/>
           </a:p>
         </p:txBody>
       </p:sp>
@@ -7372,7 +7372,7 @@
               <a:rPr lang="en-US" smtClean="0"/>
               <a:t>‹#›</a:t>
             </a:fld>
-            <a:endParaRPr lang="en-US" dirty="0"/>
+            <a:endParaRPr lang="en-US"/>
           </a:p>
         </p:txBody>
       </p:sp>
@@ -7458,9 +7458,9 @@
           <a:p>
             <a:fld id="{87DE6118-2437-4B30-8E3C-4D2BE6020583}" type="datetimeFigureOut">
               <a:rPr lang="en-US" smtClean="0"/>
-              <a:t>2/13/2022</a:t>
+              <a:t>3/21/2022</a:t>
             </a:fld>
-            <a:endParaRPr lang="en-US" dirty="0"/>
+            <a:endParaRPr lang="en-US"/>
           </a:p>
         </p:txBody>
       </p:sp>
@@ -7485,7 +7485,7 @@
           <a:bodyPr/>
           <a:lstStyle/>
           <a:p>
-            <a:endParaRPr lang="en-US" dirty="0"/>
+            <a:endParaRPr lang="en-US"/>
           </a:p>
         </p:txBody>
       </p:sp>
@@ -7514,7 +7514,7 @@
               <a:rPr lang="en-US" smtClean="0"/>
               <a:t>‹#›</a:t>
             </a:fld>
-            <a:endParaRPr lang="en-US" dirty="0"/>
+            <a:endParaRPr lang="en-US"/>
           </a:p>
         </p:txBody>
       </p:sp>
@@ -7571,9 +7571,9 @@
           <a:p>
             <a:fld id="{87DE6118-2437-4B30-8E3C-4D2BE6020583}" type="datetimeFigureOut">
               <a:rPr lang="en-US" smtClean="0"/>
-              <a:t>2/13/2022</a:t>
+              <a:t>3/21/2022</a:t>
             </a:fld>
-            <a:endParaRPr lang="en-US" dirty="0"/>
+            <a:endParaRPr lang="en-US"/>
           </a:p>
         </p:txBody>
       </p:sp>
@@ -7598,7 +7598,7 @@
           <a:bodyPr/>
           <a:lstStyle/>
           <a:p>
-            <a:endParaRPr lang="en-US" dirty="0"/>
+            <a:endParaRPr lang="en-US"/>
           </a:p>
         </p:txBody>
       </p:sp>
@@ -7627,7 +7627,7 @@
               <a:rPr lang="en-US" smtClean="0"/>
               <a:t>‹#›</a:t>
             </a:fld>
-            <a:endParaRPr lang="en-US" dirty="0"/>
+            <a:endParaRPr lang="en-US"/>
           </a:p>
         </p:txBody>
       </p:sp>
@@ -7885,9 +7885,9 @@
             <a:fld id="{87DE6118-2437-4B30-8E3C-4D2BE6020583}" type="datetimeFigureOut">
               <a:rPr lang="en-US" smtClean="0"/>
               <a:pPr/>
-              <a:t>2/13/2022</a:t>
+              <a:t>3/21/2022</a:t>
             </a:fld>
-            <a:endParaRPr lang="en-US" dirty="0"/>
+            <a:endParaRPr lang="en-US"/>
           </a:p>
         </p:txBody>
       </p:sp>
@@ -7912,7 +7912,7 @@
           <a:bodyPr/>
           <a:lstStyle/>
           <a:p>
-            <a:endParaRPr lang="en-US" dirty="0"/>
+            <a:endParaRPr lang="en-US"/>
           </a:p>
         </p:txBody>
       </p:sp>
@@ -7942,7 +7942,7 @@
               <a:pPr/>
               <a:t>‹#›</a:t>
             </a:fld>
-            <a:endParaRPr lang="en-US" dirty="0"/>
+            <a:endParaRPr lang="en-US"/>
           </a:p>
         </p:txBody>
       </p:sp>
@@ -8176,9 +8176,9 @@
             <a:fld id="{87DE6118-2437-4B30-8E3C-4D2BE6020583}" type="datetimeFigureOut">
               <a:rPr lang="en-US" smtClean="0"/>
               <a:pPr/>
-              <a:t>2/13/2022</a:t>
+              <a:t>3/21/2022</a:t>
             </a:fld>
-            <a:endParaRPr lang="en-US" dirty="0"/>
+            <a:endParaRPr lang="en-US"/>
           </a:p>
         </p:txBody>
       </p:sp>
@@ -8203,7 +8203,7 @@
           <a:bodyPr/>
           <a:lstStyle/>
           <a:p>
-            <a:endParaRPr lang="en-US" dirty="0"/>
+            <a:endParaRPr lang="en-US"/>
           </a:p>
         </p:txBody>
       </p:sp>
@@ -8233,7 +8233,7 @@
               <a:pPr/>
               <a:t>‹#›</a:t>
             </a:fld>
-            <a:endParaRPr lang="en-US" dirty="0"/>
+            <a:endParaRPr lang="en-US"/>
           </a:p>
         </p:txBody>
       </p:sp>
@@ -8421,9 +8421,9 @@
             <a:fld id="{87DE6118-2437-4B30-8E3C-4D2BE6020583}" type="datetimeFigureOut">
               <a:rPr lang="en-US" smtClean="0"/>
               <a:pPr/>
-              <a:t>2/13/2022</a:t>
+              <a:t>3/21/2022</a:t>
             </a:fld>
-            <a:endParaRPr lang="en-US" dirty="0"/>
+            <a:endParaRPr lang="en-US"/>
           </a:p>
         </p:txBody>
       </p:sp>
@@ -8466,7 +8466,7 @@
             </a:lvl1pPr>
           </a:lstStyle>
           <a:p>
-            <a:endParaRPr lang="en-US" dirty="0"/>
+            <a:endParaRPr lang="en-US"/>
           </a:p>
         </p:txBody>
       </p:sp>
@@ -8514,7 +8514,7 @@
               <a:pPr/>
               <a:t>‹#›</a:t>
             </a:fld>
-            <a:endParaRPr lang="en-US" dirty="0"/>
+            <a:endParaRPr lang="en-US"/>
           </a:p>
         </p:txBody>
       </p:sp>
@@ -9058,9 +9058,9 @@
             <a:fld id="{87DE6118-2437-4B30-8E3C-4D2BE6020583}" type="datetimeFigureOut">
               <a:rPr lang="en-US" smtClean="0"/>
               <a:pPr/>
-              <a:t>2/13/2022</a:t>
+              <a:t>3/21/2022</a:t>
             </a:fld>
-            <a:endParaRPr lang="en-US" dirty="0"/>
+            <a:endParaRPr lang="en-US"/>
           </a:p>
         </p:txBody>
       </p:sp>
@@ -9097,7 +9097,7 @@
             </a:lvl1pPr>
           </a:lstStyle>
           <a:p>
-            <a:endParaRPr lang="en-US" dirty="0"/>
+            <a:endParaRPr lang="en-US"/>
           </a:p>
         </p:txBody>
       </p:sp>
@@ -9137,7 +9137,7 @@
               <a:pPr/>
               <a:t>‹#›</a:t>
             </a:fld>
-            <a:endParaRPr lang="en-US" dirty="0"/>
+            <a:endParaRPr lang="en-US"/>
           </a:p>
         </p:txBody>
       </p:sp>
@@ -9704,9 +9704,9 @@
             <a:fld id="{87DE6118-2437-4B30-8E3C-4D2BE6020583}" type="datetimeFigureOut">
               <a:rPr lang="en-US" smtClean="0"/>
               <a:pPr/>
-              <a:t>2/13/2022</a:t>
+              <a:t>3/21/2022</a:t>
             </a:fld>
-            <a:endParaRPr lang="en-US" dirty="0"/>
+            <a:endParaRPr lang="en-US"/>
           </a:p>
         </p:txBody>
       </p:sp>
@@ -9749,7 +9749,7 @@
             </a:lvl1pPr>
           </a:lstStyle>
           <a:p>
-            <a:endParaRPr lang="en-US" dirty="0"/>
+            <a:endParaRPr lang="en-US"/>
           </a:p>
         </p:txBody>
       </p:sp>
@@ -9797,7 +9797,7 @@
               <a:pPr/>
               <a:t>‹#›</a:t>
             </a:fld>
-            <a:endParaRPr lang="en-US" dirty="0"/>
+            <a:endParaRPr lang="en-US"/>
           </a:p>
         </p:txBody>
       </p:sp>
@@ -10156,8 +10156,20 @@
           <a:lstStyle/>
           <a:p>
             <a:r>
+              <a:rPr lang="en-US" sz="3600" err="1"/>
+              <a:t>Instalare</a:t>
+            </a:r>
+            <a:r>
               <a:rPr lang="en-US" sz="3600"/>
-              <a:t>Instalare aplicatie Laravel</a:t>
+              <a:t> </a:t>
+            </a:r>
+            <a:r>
+              <a:rPr lang="en-US" sz="3600" err="1"/>
+              <a:t>aplicatie</a:t>
+            </a:r>
+            <a:r>
+              <a:rPr lang="en-US" sz="3600"/>
+              <a:t> Laravel</a:t>
             </a:r>
             <a:endParaRPr lang="ro-RO" sz="3600"/>
           </a:p>
@@ -16371,7 +16383,7 @@
                     <a:lstStyle/>
                     <a:p>
                       <a:r>
-                        <a:rPr lang="en-US" sz="1400" dirty="0"/>
+                        <a:rPr lang="en-US" sz="1400"/>
                         <a:t>position</a:t>
                       </a:r>
                     </a:p>
@@ -16397,10 +16409,10 @@
                     <a:lstStyle/>
                     <a:p>
                       <a:r>
-                        <a:rPr lang="en-US" sz="1400" dirty="0"/>
+                        <a:rPr lang="en-US" sz="1400"/>
                         <a:t>active</a:t>
                       </a:r>
-                      <a:endParaRPr lang="ro-RO" sz="1400" dirty="0"/>
+                      <a:endParaRPr lang="ro-RO" sz="1400"/>
                     </a:p>
                   </a:txBody>
                   <a:tcPr>
@@ -16424,10 +16436,10 @@
                     <a:lstStyle/>
                     <a:p>
                       <a:r>
-                        <a:rPr lang="en-US" sz="1400" dirty="0"/>
+                        <a:rPr lang="en-US" sz="1400"/>
                         <a:t>promo</a:t>
                       </a:r>
-                      <a:endParaRPr lang="ro-RO" sz="1400" dirty="0"/>
+                      <a:endParaRPr lang="ro-RO" sz="1400"/>
                     </a:p>
                   </a:txBody>
                   <a:tcPr>
@@ -16507,10 +16519,10 @@
                     <a:lstStyle/>
                     <a:p>
                       <a:r>
-                        <a:rPr lang="en-US" sz="1400" dirty="0" err="1"/>
+                        <a:rPr lang="en-US" sz="1400" err="1"/>
                         <a:t>meta_title</a:t>
                       </a:r>
-                      <a:endParaRPr lang="ro-RO" sz="1400" dirty="0"/>
+                      <a:endParaRPr lang="ro-RO" sz="1400"/>
                     </a:p>
                   </a:txBody>
                   <a:tcPr>
@@ -16619,10 +16631,10 @@
                     <a:lstStyle/>
                     <a:p>
                       <a:r>
-                        <a:rPr lang="en-US" sz="1400" b="1" dirty="0"/>
+                        <a:rPr lang="en-US" sz="1400" b="1"/>
                         <a:t>Photos</a:t>
                       </a:r>
-                      <a:endParaRPr lang="ro-RO" sz="1400" b="1" dirty="0"/>
+                      <a:endParaRPr lang="ro-RO" sz="1400" b="1"/>
                     </a:p>
                   </a:txBody>
                   <a:tcPr>
@@ -16647,10 +16659,10 @@
                     <a:lstStyle/>
                     <a:p>
                       <a:r>
-                        <a:rPr lang="en-US" sz="1400" dirty="0"/>
+                        <a:rPr lang="en-US" sz="1400"/>
                         <a:t>id</a:t>
                       </a:r>
-                      <a:endParaRPr lang="ro-RO" sz="1400" dirty="0"/>
+                      <a:endParaRPr lang="ro-RO" sz="1400"/>
                     </a:p>
                   </a:txBody>
                   <a:tcPr/>
@@ -16860,10 +16872,10 @@
                     <a:lstStyle/>
                     <a:p>
                       <a:r>
-                        <a:rPr lang="en-US" sz="1400" dirty="0" err="1"/>
+                        <a:rPr lang="en-US" sz="1400" err="1"/>
                         <a:t>photoable_type</a:t>
                       </a:r>
-                      <a:endParaRPr lang="ro-RO" sz="1400" dirty="0"/>
+                      <a:endParaRPr lang="ro-RO" sz="1400"/>
                     </a:p>
                   </a:txBody>
                   <a:tcPr>
@@ -21866,10 +21878,10 @@
                     <a:lstStyle/>
                     <a:p>
                       <a:r>
-                        <a:rPr lang="en-US" sz="1400" b="1" dirty="0"/>
+                        <a:rPr lang="en-US" sz="1400" b="1"/>
                         <a:t>Sections</a:t>
                       </a:r>
-                      <a:endParaRPr lang="ro-RO" sz="1400" b="1" dirty="0"/>
+                      <a:endParaRPr lang="ro-RO" sz="1400" b="1"/>
                     </a:p>
                   </a:txBody>
                   <a:tcPr>
@@ -21979,10 +21991,10 @@
                     <a:lstStyle/>
                     <a:p>
                       <a:r>
-                        <a:rPr lang="en-US" sz="1400" b="1" dirty="0"/>
+                        <a:rPr lang="en-US" sz="1400" b="1"/>
                         <a:t>Brands</a:t>
                       </a:r>
-                      <a:endParaRPr lang="ro-RO" sz="1400" b="1" dirty="0"/>
+                      <a:endParaRPr lang="ro-RO" sz="1400" b="1"/>
                     </a:p>
                   </a:txBody>
                   <a:tcPr>
@@ -22091,10 +22103,10 @@
                     <a:lstStyle/>
                     <a:p>
                       <a:r>
-                        <a:rPr lang="en-US" sz="1400" b="1" dirty="0"/>
+                        <a:rPr lang="en-US" sz="1400" b="1"/>
                         <a:t>Photos</a:t>
                       </a:r>
-                      <a:endParaRPr lang="ro-RO" sz="1400" b="1" dirty="0"/>
+                      <a:endParaRPr lang="ro-RO" sz="1400" b="1"/>
                     </a:p>
                   </a:txBody>
                   <a:tcPr>
@@ -22239,10 +22251,10 @@
                     <a:lstStyle/>
                     <a:p>
                       <a:r>
-                        <a:rPr lang="en-US" sz="1400" b="1" dirty="0"/>
+                        <a:rPr lang="en-US" sz="1400" b="1"/>
                         <a:t>categories</a:t>
                       </a:r>
-                      <a:endParaRPr lang="ro-RO" sz="1400" b="1" dirty="0"/>
+                      <a:endParaRPr lang="ro-RO" sz="1400" b="1"/>
                     </a:p>
                   </a:txBody>
                   <a:tcPr>
@@ -23294,6 +23306,2482 @@
 </p:sld>
 </file>
 
+<file path=ppt/slides/slide21.xml><?xml version="1.0" encoding="utf-8"?>
+<p:sld xmlns:a="http://schemas.openxmlformats.org/drawingml/2006/main" xmlns:r="http://schemas.openxmlformats.org/officeDocument/2006/relationships" xmlns:p="http://schemas.openxmlformats.org/presentationml/2006/main">
+  <p:cSld>
+    <p:bg>
+      <p:bgPr>
+        <a:solidFill>
+          <a:schemeClr val="bg1">
+            <a:lumMod val="95000"/>
+          </a:schemeClr>
+        </a:solidFill>
+        <a:effectLst/>
+      </p:bgPr>
+    </p:bg>
+    <p:spTree>
+      <p:nvGrpSpPr>
+        <p:cNvPr id="1" name=""/>
+        <p:cNvGrpSpPr/>
+        <p:nvPr/>
+      </p:nvGrpSpPr>
+      <p:grpSpPr>
+        <a:xfrm>
+          <a:off x="0" y="0"/>
+          <a:ext cx="0" cy="0"/>
+          <a:chOff x="0" y="0"/>
+          <a:chExt cx="0" cy="0"/>
+        </a:xfrm>
+      </p:grpSpPr>
+      <p:sp>
+        <p:nvSpPr>
+          <p:cNvPr id="2" name="Title 1">
+            <a:extLst>
+              <a:ext uri="{FF2B5EF4-FFF2-40B4-BE49-F238E27FC236}">
+                <a16:creationId xmlns:a16="http://schemas.microsoft.com/office/drawing/2014/main" id="{1278B2C4-88FC-475E-BE01-163F0C289BD8}"/>
+              </a:ext>
+            </a:extLst>
+          </p:cNvPr>
+          <p:cNvSpPr>
+            <a:spLocks noGrp="1"/>
+          </p:cNvSpPr>
+          <p:nvPr>
+            <p:ph type="title"/>
+          </p:nvPr>
+        </p:nvSpPr>
+        <p:spPr>
+          <a:xfrm>
+            <a:off x="838200" y="365125"/>
+            <a:ext cx="10515600" cy="498941"/>
+          </a:xfrm>
+        </p:spPr>
+        <p:style>
+          <a:lnRef idx="2">
+            <a:schemeClr val="dk1">
+              <a:shade val="50000"/>
+            </a:schemeClr>
+          </a:lnRef>
+          <a:fillRef idx="1">
+            <a:schemeClr val="dk1"/>
+          </a:fillRef>
+          <a:effectRef idx="0">
+            <a:schemeClr val="dk1"/>
+          </a:effectRef>
+          <a:fontRef idx="minor">
+            <a:schemeClr val="lt1"/>
+          </a:fontRef>
+        </p:style>
+        <p:txBody>
+          <a:bodyPr>
+            <a:normAutofit/>
+          </a:bodyPr>
+          <a:lstStyle/>
+          <a:p>
+            <a:r>
+              <a:rPr lang="en-US" sz="2000"/>
+              <a:t>Cart products table</a:t>
+            </a:r>
+          </a:p>
+        </p:txBody>
+      </p:sp>
+      <p:sp>
+        <p:nvSpPr>
+          <p:cNvPr id="3" name="TextBox 2">
+            <a:extLst>
+              <a:ext uri="{FF2B5EF4-FFF2-40B4-BE49-F238E27FC236}">
+                <a16:creationId xmlns:a16="http://schemas.microsoft.com/office/drawing/2014/main" id="{B9DDD042-2933-4E60-B920-59B1DC53F9E8}"/>
+              </a:ext>
+            </a:extLst>
+          </p:cNvPr>
+          <p:cNvSpPr txBox="1"/>
+          <p:nvPr/>
+        </p:nvSpPr>
+        <p:spPr>
+          <a:xfrm>
+            <a:off x="710360" y="1062564"/>
+            <a:ext cx="4781630" cy="369332"/>
+          </a:xfrm>
+          <a:prstGeom prst="rect">
+            <a:avLst/>
+          </a:prstGeom>
+          <a:noFill/>
+        </p:spPr>
+        <p:txBody>
+          <a:bodyPr wrap="none" rtlCol="0">
+            <a:spAutoFit/>
+          </a:bodyPr>
+          <a:lstStyle/>
+          <a:p>
+            <a:r>
+              <a:rPr lang="en-US"/>
+              <a:t>php artisan make:livewire Products/CartProducts</a:t>
+            </a:r>
+          </a:p>
+        </p:txBody>
+      </p:sp>
+      <p:sp>
+        <p:nvSpPr>
+          <p:cNvPr id="4" name="TextBox 3">
+            <a:extLst>
+              <a:ext uri="{FF2B5EF4-FFF2-40B4-BE49-F238E27FC236}">
+                <a16:creationId xmlns:a16="http://schemas.microsoft.com/office/drawing/2014/main" id="{E7D23CEE-6F0C-4D52-9BC5-BEA9342623D4}"/>
+              </a:ext>
+            </a:extLst>
+          </p:cNvPr>
+          <p:cNvSpPr txBox="1"/>
+          <p:nvPr/>
+        </p:nvSpPr>
+        <p:spPr>
+          <a:xfrm>
+            <a:off x="641717" y="1491482"/>
+            <a:ext cx="7469224" cy="369332"/>
+          </a:xfrm>
+          <a:prstGeom prst="rect">
+            <a:avLst/>
+          </a:prstGeom>
+          <a:noFill/>
+        </p:spPr>
+        <p:txBody>
+          <a:bodyPr wrap="none" rtlCol="0">
+            <a:spAutoFit/>
+          </a:bodyPr>
+          <a:lstStyle/>
+          <a:p>
+            <a:r>
+              <a:rPr lang="en-US"/>
+              <a:t>Creem relatia dintre itemii cosului (modelul </a:t>
+            </a:r>
+            <a:r>
+              <a:rPr lang="en-US">
+                <a:solidFill>
+                  <a:srgbClr val="C00000"/>
+                </a:solidFill>
+              </a:rPr>
+              <a:t>Cart</a:t>
+            </a:r>
+            <a:r>
+              <a:rPr lang="en-US"/>
+              <a:t>) si produse (modelul </a:t>
+            </a:r>
+            <a:r>
+              <a:rPr lang="en-US">
+                <a:solidFill>
+                  <a:srgbClr val="C00000"/>
+                </a:solidFill>
+              </a:rPr>
+              <a:t>Product</a:t>
+            </a:r>
+            <a:r>
+              <a:rPr lang="en-US"/>
+              <a:t>)</a:t>
+            </a:r>
+          </a:p>
+        </p:txBody>
+      </p:sp>
+      <p:sp>
+        <p:nvSpPr>
+          <p:cNvPr id="6" name="TextBox 5">
+            <a:extLst>
+              <a:ext uri="{FF2B5EF4-FFF2-40B4-BE49-F238E27FC236}">
+                <a16:creationId xmlns:a16="http://schemas.microsoft.com/office/drawing/2014/main" id="{03C1ECEF-F634-4296-8142-6774BE13EB96}"/>
+              </a:ext>
+            </a:extLst>
+          </p:cNvPr>
+          <p:cNvSpPr txBox="1"/>
+          <p:nvPr/>
+        </p:nvSpPr>
+        <p:spPr>
+          <a:xfrm>
+            <a:off x="641717" y="2059312"/>
+            <a:ext cx="8895248" cy="1200329"/>
+          </a:xfrm>
+          <a:prstGeom prst="rect">
+            <a:avLst/>
+          </a:prstGeom>
+          <a:noFill/>
+        </p:spPr>
+        <p:txBody>
+          <a:bodyPr wrap="square">
+            <a:spAutoFit/>
+          </a:bodyPr>
+          <a:lstStyle/>
+          <a:p>
+            <a:r>
+              <a:rPr lang="en-US" b="0">
+                <a:solidFill>
+                  <a:srgbClr val="F9E7C4"/>
+                </a:solidFill>
+                <a:effectLst/>
+                <a:latin typeface="Consolas" panose="020B0609020204030204" pitchFamily="49" charset="0"/>
+              </a:rPr>
+              <a:t> </a:t>
+            </a:r>
+            <a:r>
+              <a:rPr lang="en-US" b="0">
+                <a:solidFill>
+                  <a:srgbClr val="B294BB"/>
+                </a:solidFill>
+                <a:effectLst/>
+                <a:latin typeface="Consolas" panose="020B0609020204030204" pitchFamily="49" charset="0"/>
+              </a:rPr>
+              <a:t>public</a:t>
+            </a:r>
+            <a:r>
+              <a:rPr lang="en-US" b="0">
+                <a:solidFill>
+                  <a:srgbClr val="F9E7C4"/>
+                </a:solidFill>
+                <a:effectLst/>
+                <a:latin typeface="Consolas" panose="020B0609020204030204" pitchFamily="49" charset="0"/>
+              </a:rPr>
+              <a:t> </a:t>
+            </a:r>
+            <a:r>
+              <a:rPr lang="en-US" b="0">
+                <a:solidFill>
+                  <a:srgbClr val="B294BB"/>
+                </a:solidFill>
+                <a:effectLst/>
+                <a:latin typeface="Consolas" panose="020B0609020204030204" pitchFamily="49" charset="0"/>
+              </a:rPr>
+              <a:t>function</a:t>
+            </a:r>
+            <a:r>
+              <a:rPr lang="en-US" b="0">
+                <a:solidFill>
+                  <a:srgbClr val="F9E7C4"/>
+                </a:solidFill>
+                <a:effectLst/>
+                <a:latin typeface="Consolas" panose="020B0609020204030204" pitchFamily="49" charset="0"/>
+              </a:rPr>
+              <a:t> </a:t>
+            </a:r>
+            <a:r>
+              <a:rPr lang="en-US" b="0">
+                <a:solidFill>
+                  <a:srgbClr val="81A2BE"/>
+                </a:solidFill>
+                <a:effectLst/>
+                <a:latin typeface="Consolas" panose="020B0609020204030204" pitchFamily="49" charset="0"/>
+              </a:rPr>
+              <a:t>product</a:t>
+            </a:r>
+            <a:r>
+              <a:rPr lang="en-US" b="0">
+                <a:solidFill>
+                  <a:srgbClr val="81755D"/>
+                </a:solidFill>
+                <a:effectLst/>
+                <a:latin typeface="Consolas" panose="020B0609020204030204" pitchFamily="49" charset="0"/>
+              </a:rPr>
+              <a:t>()</a:t>
+            </a:r>
+            <a:endParaRPr lang="en-US" b="0">
+              <a:solidFill>
+                <a:srgbClr val="F9E7C4"/>
+              </a:solidFill>
+              <a:effectLst/>
+              <a:latin typeface="Consolas" panose="020B0609020204030204" pitchFamily="49" charset="0"/>
+            </a:endParaRPr>
+          </a:p>
+          <a:p>
+            <a:r>
+              <a:rPr lang="en-US" b="0">
+                <a:solidFill>
+                  <a:srgbClr val="F9E7C4"/>
+                </a:solidFill>
+                <a:effectLst/>
+                <a:latin typeface="Consolas" panose="020B0609020204030204" pitchFamily="49" charset="0"/>
+              </a:rPr>
+              <a:t>    </a:t>
+            </a:r>
+            <a:r>
+              <a:rPr lang="en-US" b="0">
+                <a:solidFill>
+                  <a:srgbClr val="81755D"/>
+                </a:solidFill>
+                <a:effectLst/>
+                <a:latin typeface="Consolas" panose="020B0609020204030204" pitchFamily="49" charset="0"/>
+              </a:rPr>
+              <a:t>{</a:t>
+            </a:r>
+            <a:endParaRPr lang="en-US" b="0">
+              <a:solidFill>
+                <a:srgbClr val="F9E7C4"/>
+              </a:solidFill>
+              <a:effectLst/>
+              <a:latin typeface="Consolas" panose="020B0609020204030204" pitchFamily="49" charset="0"/>
+            </a:endParaRPr>
+          </a:p>
+          <a:p>
+            <a:r>
+              <a:rPr lang="en-US" b="0">
+                <a:solidFill>
+                  <a:srgbClr val="F9E7C4"/>
+                </a:solidFill>
+                <a:effectLst/>
+                <a:latin typeface="Consolas" panose="020B0609020204030204" pitchFamily="49" charset="0"/>
+              </a:rPr>
+              <a:t>        </a:t>
+            </a:r>
+            <a:r>
+              <a:rPr lang="en-US" b="0">
+                <a:solidFill>
+                  <a:srgbClr val="B294BB"/>
+                </a:solidFill>
+                <a:effectLst/>
+                <a:latin typeface="Consolas" panose="020B0609020204030204" pitchFamily="49" charset="0"/>
+              </a:rPr>
+              <a:t>return</a:t>
+            </a:r>
+            <a:r>
+              <a:rPr lang="en-US" b="0">
+                <a:solidFill>
+                  <a:srgbClr val="F9E7C4"/>
+                </a:solidFill>
+                <a:effectLst/>
+                <a:latin typeface="Consolas" panose="020B0609020204030204" pitchFamily="49" charset="0"/>
+              </a:rPr>
+              <a:t> </a:t>
+            </a:r>
+            <a:r>
+              <a:rPr lang="en-US" b="0">
+                <a:solidFill>
+                  <a:srgbClr val="81755D"/>
+                </a:solidFill>
+                <a:effectLst/>
+                <a:latin typeface="Consolas" panose="020B0609020204030204" pitchFamily="49" charset="0"/>
+              </a:rPr>
+              <a:t>$</a:t>
+            </a:r>
+            <a:r>
+              <a:rPr lang="en-US" b="0">
+                <a:solidFill>
+                  <a:srgbClr val="CC6666"/>
+                </a:solidFill>
+                <a:effectLst/>
+                <a:latin typeface="Consolas" panose="020B0609020204030204" pitchFamily="49" charset="0"/>
+              </a:rPr>
+              <a:t>this</a:t>
+            </a:r>
+            <a:r>
+              <a:rPr lang="en-US" b="0">
+                <a:solidFill>
+                  <a:srgbClr val="B294BB"/>
+                </a:solidFill>
+                <a:effectLst/>
+                <a:latin typeface="Consolas" panose="020B0609020204030204" pitchFamily="49" charset="0"/>
+              </a:rPr>
+              <a:t>-&gt;</a:t>
+            </a:r>
+            <a:r>
+              <a:rPr lang="en-US" b="0">
+                <a:solidFill>
+                  <a:srgbClr val="81A2BE"/>
+                </a:solidFill>
+                <a:effectLst/>
+                <a:latin typeface="Consolas" panose="020B0609020204030204" pitchFamily="49" charset="0"/>
+              </a:rPr>
+              <a:t>belongsTo</a:t>
+            </a:r>
+            <a:r>
+              <a:rPr lang="en-US" b="0">
+                <a:solidFill>
+                  <a:srgbClr val="81755D"/>
+                </a:solidFill>
+                <a:effectLst/>
+                <a:latin typeface="Consolas" panose="020B0609020204030204" pitchFamily="49" charset="0"/>
+              </a:rPr>
+              <a:t>(</a:t>
+            </a:r>
+            <a:r>
+              <a:rPr lang="en-US" b="0">
+                <a:solidFill>
+                  <a:srgbClr val="F0C674"/>
+                </a:solidFill>
+                <a:effectLst/>
+                <a:latin typeface="Consolas" panose="020B0609020204030204" pitchFamily="49" charset="0"/>
+              </a:rPr>
+              <a:t>Product</a:t>
+            </a:r>
+            <a:r>
+              <a:rPr lang="en-US" b="0">
+                <a:solidFill>
+                  <a:srgbClr val="B294BB"/>
+                </a:solidFill>
+                <a:effectLst/>
+                <a:latin typeface="Consolas" panose="020B0609020204030204" pitchFamily="49" charset="0"/>
+              </a:rPr>
+              <a:t>::class</a:t>
+            </a:r>
+            <a:r>
+              <a:rPr lang="en-US" b="0">
+                <a:solidFill>
+                  <a:srgbClr val="81755D"/>
+                </a:solidFill>
+                <a:effectLst/>
+                <a:latin typeface="Consolas" panose="020B0609020204030204" pitchFamily="49" charset="0"/>
+              </a:rPr>
+              <a:t>,</a:t>
+            </a:r>
+            <a:r>
+              <a:rPr lang="en-US" b="0">
+                <a:solidFill>
+                  <a:srgbClr val="F9E7C4"/>
+                </a:solidFill>
+                <a:effectLst/>
+                <a:latin typeface="Consolas" panose="020B0609020204030204" pitchFamily="49" charset="0"/>
+              </a:rPr>
+              <a:t> </a:t>
+            </a:r>
+            <a:r>
+              <a:rPr lang="en-US" b="0">
+                <a:solidFill>
+                  <a:srgbClr val="81755D"/>
+                </a:solidFill>
+                <a:effectLst/>
+                <a:latin typeface="Consolas" panose="020B0609020204030204" pitchFamily="49" charset="0"/>
+              </a:rPr>
+              <a:t>'</a:t>
+            </a:r>
+            <a:r>
+              <a:rPr lang="en-US" b="0">
+                <a:solidFill>
+                  <a:srgbClr val="B5BD68"/>
+                </a:solidFill>
+                <a:effectLst/>
+                <a:latin typeface="Consolas" panose="020B0609020204030204" pitchFamily="49" charset="0"/>
+              </a:rPr>
+              <a:t>product_id</a:t>
+            </a:r>
+            <a:r>
+              <a:rPr lang="en-US" b="0">
+                <a:solidFill>
+                  <a:srgbClr val="81755D"/>
+                </a:solidFill>
+                <a:effectLst/>
+                <a:latin typeface="Consolas" panose="020B0609020204030204" pitchFamily="49" charset="0"/>
+              </a:rPr>
+              <a:t>');</a:t>
+            </a:r>
+            <a:endParaRPr lang="en-US" b="0">
+              <a:solidFill>
+                <a:srgbClr val="F9E7C4"/>
+              </a:solidFill>
+              <a:effectLst/>
+              <a:latin typeface="Consolas" panose="020B0609020204030204" pitchFamily="49" charset="0"/>
+            </a:endParaRPr>
+          </a:p>
+          <a:p>
+            <a:r>
+              <a:rPr lang="en-US" b="0">
+                <a:solidFill>
+                  <a:srgbClr val="F9E7C4"/>
+                </a:solidFill>
+                <a:effectLst/>
+                <a:latin typeface="Consolas" panose="020B0609020204030204" pitchFamily="49" charset="0"/>
+              </a:rPr>
+              <a:t>    </a:t>
+            </a:r>
+            <a:r>
+              <a:rPr lang="en-US" b="0">
+                <a:solidFill>
+                  <a:srgbClr val="81755D"/>
+                </a:solidFill>
+                <a:effectLst/>
+                <a:latin typeface="Consolas" panose="020B0609020204030204" pitchFamily="49" charset="0"/>
+              </a:rPr>
+              <a:t>}</a:t>
+            </a:r>
+            <a:endParaRPr lang="en-US" b="0">
+              <a:solidFill>
+                <a:srgbClr val="F9E7C4"/>
+              </a:solidFill>
+              <a:effectLst/>
+              <a:latin typeface="Consolas" panose="020B0609020204030204" pitchFamily="49" charset="0"/>
+            </a:endParaRPr>
+          </a:p>
+        </p:txBody>
+      </p:sp>
+      <p:sp>
+        <p:nvSpPr>
+          <p:cNvPr id="7" name="TextBox 6">
+            <a:extLst>
+              <a:ext uri="{FF2B5EF4-FFF2-40B4-BE49-F238E27FC236}">
+                <a16:creationId xmlns:a16="http://schemas.microsoft.com/office/drawing/2014/main" id="{BB0B0064-E926-4549-A5DC-9EF698A11B52}"/>
+              </a:ext>
+            </a:extLst>
+          </p:cNvPr>
+          <p:cNvSpPr txBox="1"/>
+          <p:nvPr/>
+        </p:nvSpPr>
+        <p:spPr>
+          <a:xfrm>
+            <a:off x="710360" y="3354677"/>
+            <a:ext cx="8094011" cy="369332"/>
+          </a:xfrm>
+          <a:prstGeom prst="rect">
+            <a:avLst/>
+          </a:prstGeom>
+          <a:noFill/>
+        </p:spPr>
+        <p:txBody>
+          <a:bodyPr wrap="none" rtlCol="0">
+            <a:spAutoFit/>
+          </a:bodyPr>
+          <a:lstStyle/>
+          <a:p>
+            <a:r>
+              <a:rPr lang="en-US"/>
+              <a:t>Creem functia statica in modelul Cart care sa intoarca itemii din cosul de cumparaturi</a:t>
+            </a:r>
+          </a:p>
+        </p:txBody>
+      </p:sp>
+      <p:sp>
+        <p:nvSpPr>
+          <p:cNvPr id="9" name="TextBox 8">
+            <a:extLst>
+              <a:ext uri="{FF2B5EF4-FFF2-40B4-BE49-F238E27FC236}">
+                <a16:creationId xmlns:a16="http://schemas.microsoft.com/office/drawing/2014/main" id="{1D081BE2-3828-4692-8966-3A3D0D740E28}"/>
+              </a:ext>
+            </a:extLst>
+          </p:cNvPr>
+          <p:cNvSpPr txBox="1"/>
+          <p:nvPr/>
+        </p:nvSpPr>
+        <p:spPr>
+          <a:xfrm>
+            <a:off x="476093" y="3819045"/>
+            <a:ext cx="9922373" cy="2677656"/>
+          </a:xfrm>
+          <a:prstGeom prst="rect">
+            <a:avLst/>
+          </a:prstGeom>
+          <a:noFill/>
+        </p:spPr>
+        <p:txBody>
+          <a:bodyPr wrap="square">
+            <a:spAutoFit/>
+          </a:bodyPr>
+          <a:lstStyle/>
+          <a:p>
+            <a:r>
+              <a:rPr lang="en-US" sz="1200" b="0">
+                <a:solidFill>
+                  <a:srgbClr val="B294BB"/>
+                </a:solidFill>
+                <a:effectLst/>
+                <a:latin typeface="Consolas" panose="020B0609020204030204" pitchFamily="49" charset="0"/>
+              </a:rPr>
+              <a:t>public</a:t>
+            </a:r>
+            <a:r>
+              <a:rPr lang="en-US" sz="1200" b="0">
+                <a:solidFill>
+                  <a:srgbClr val="F9E7C4"/>
+                </a:solidFill>
+                <a:effectLst/>
+                <a:latin typeface="Consolas" panose="020B0609020204030204" pitchFamily="49" charset="0"/>
+              </a:rPr>
+              <a:t> </a:t>
+            </a:r>
+            <a:r>
+              <a:rPr lang="en-US" sz="1200" b="0">
+                <a:solidFill>
+                  <a:srgbClr val="B294BB"/>
+                </a:solidFill>
+                <a:effectLst/>
+                <a:latin typeface="Consolas" panose="020B0609020204030204" pitchFamily="49" charset="0"/>
+              </a:rPr>
+              <a:t>static</a:t>
+            </a:r>
+            <a:r>
+              <a:rPr lang="en-US" sz="1200" b="0">
+                <a:solidFill>
+                  <a:srgbClr val="F9E7C4"/>
+                </a:solidFill>
+                <a:effectLst/>
+                <a:latin typeface="Consolas" panose="020B0609020204030204" pitchFamily="49" charset="0"/>
+              </a:rPr>
+              <a:t> </a:t>
+            </a:r>
+            <a:r>
+              <a:rPr lang="en-US" sz="1200" b="0">
+                <a:solidFill>
+                  <a:srgbClr val="B294BB"/>
+                </a:solidFill>
+                <a:effectLst/>
+                <a:latin typeface="Consolas" panose="020B0609020204030204" pitchFamily="49" charset="0"/>
+              </a:rPr>
+              <a:t>function</a:t>
+            </a:r>
+            <a:r>
+              <a:rPr lang="en-US" sz="1200" b="0">
+                <a:solidFill>
+                  <a:srgbClr val="F9E7C4"/>
+                </a:solidFill>
+                <a:effectLst/>
+                <a:latin typeface="Consolas" panose="020B0609020204030204" pitchFamily="49" charset="0"/>
+              </a:rPr>
+              <a:t> </a:t>
+            </a:r>
+            <a:r>
+              <a:rPr lang="en-US" sz="1200" b="0">
+                <a:solidFill>
+                  <a:srgbClr val="81A2BE"/>
+                </a:solidFill>
+                <a:effectLst/>
+                <a:latin typeface="Consolas" panose="020B0609020204030204" pitchFamily="49" charset="0"/>
+              </a:rPr>
+              <a:t>cartProducts</a:t>
+            </a:r>
+            <a:r>
+              <a:rPr lang="en-US" sz="1200" b="0">
+                <a:solidFill>
+                  <a:srgbClr val="81755D"/>
+                </a:solidFill>
+                <a:effectLst/>
+                <a:latin typeface="Consolas" panose="020B0609020204030204" pitchFamily="49" charset="0"/>
+              </a:rPr>
+              <a:t>()</a:t>
+            </a:r>
+            <a:endParaRPr lang="en-US" sz="1200" b="0">
+              <a:solidFill>
+                <a:srgbClr val="F9E7C4"/>
+              </a:solidFill>
+              <a:effectLst/>
+              <a:latin typeface="Consolas" panose="020B0609020204030204" pitchFamily="49" charset="0"/>
+            </a:endParaRPr>
+          </a:p>
+          <a:p>
+            <a:r>
+              <a:rPr lang="en-US" sz="1200" b="0">
+                <a:solidFill>
+                  <a:srgbClr val="F9E7C4"/>
+                </a:solidFill>
+                <a:effectLst/>
+                <a:latin typeface="Consolas" panose="020B0609020204030204" pitchFamily="49" charset="0"/>
+              </a:rPr>
+              <a:t>    </a:t>
+            </a:r>
+            <a:r>
+              <a:rPr lang="en-US" sz="1200" b="0">
+                <a:solidFill>
+                  <a:srgbClr val="81755D"/>
+                </a:solidFill>
+                <a:effectLst/>
+                <a:latin typeface="Consolas" panose="020B0609020204030204" pitchFamily="49" charset="0"/>
+              </a:rPr>
+              <a:t>{</a:t>
+            </a:r>
+            <a:endParaRPr lang="en-US" sz="1200" b="0">
+              <a:solidFill>
+                <a:srgbClr val="F9E7C4"/>
+              </a:solidFill>
+              <a:effectLst/>
+              <a:latin typeface="Consolas" panose="020B0609020204030204" pitchFamily="49" charset="0"/>
+            </a:endParaRPr>
+          </a:p>
+          <a:p>
+            <a:r>
+              <a:rPr lang="en-US" sz="1200" b="0">
+                <a:solidFill>
+                  <a:srgbClr val="F9E7C4"/>
+                </a:solidFill>
+                <a:effectLst/>
+                <a:latin typeface="Consolas" panose="020B0609020204030204" pitchFamily="49" charset="0"/>
+              </a:rPr>
+              <a:t>        </a:t>
+            </a:r>
+            <a:r>
+              <a:rPr lang="en-US" sz="1200" b="0">
+                <a:solidFill>
+                  <a:srgbClr val="B294BB"/>
+                </a:solidFill>
+                <a:effectLst/>
+                <a:latin typeface="Consolas" panose="020B0609020204030204" pitchFamily="49" charset="0"/>
+              </a:rPr>
+              <a:t>if</a:t>
+            </a:r>
+            <a:r>
+              <a:rPr lang="en-US" sz="1200" b="0">
+                <a:solidFill>
+                  <a:srgbClr val="F9E7C4"/>
+                </a:solidFill>
+                <a:effectLst/>
+                <a:latin typeface="Consolas" panose="020B0609020204030204" pitchFamily="49" charset="0"/>
+              </a:rPr>
+              <a:t> </a:t>
+            </a:r>
+            <a:r>
+              <a:rPr lang="en-US" sz="1200" b="0">
+                <a:solidFill>
+                  <a:srgbClr val="81755D"/>
+                </a:solidFill>
+                <a:effectLst/>
+                <a:latin typeface="Consolas" panose="020B0609020204030204" pitchFamily="49" charset="0"/>
+              </a:rPr>
+              <a:t>(</a:t>
+            </a:r>
+            <a:r>
+              <a:rPr lang="en-US" sz="1200" b="0">
+                <a:solidFill>
+                  <a:srgbClr val="F0C674"/>
+                </a:solidFill>
+                <a:effectLst/>
+                <a:latin typeface="Consolas" panose="020B0609020204030204" pitchFamily="49" charset="0"/>
+              </a:rPr>
+              <a:t>Auth</a:t>
+            </a:r>
+            <a:r>
+              <a:rPr lang="en-US" sz="1200" b="0">
+                <a:solidFill>
+                  <a:srgbClr val="B294BB"/>
+                </a:solidFill>
+                <a:effectLst/>
+                <a:latin typeface="Consolas" panose="020B0609020204030204" pitchFamily="49" charset="0"/>
+              </a:rPr>
+              <a:t>::</a:t>
+            </a:r>
+            <a:r>
+              <a:rPr lang="en-US" sz="1200" b="0">
+                <a:solidFill>
+                  <a:srgbClr val="81A2BE"/>
+                </a:solidFill>
+                <a:effectLst/>
+                <a:latin typeface="Consolas" panose="020B0609020204030204" pitchFamily="49" charset="0"/>
+              </a:rPr>
+              <a:t>check</a:t>
+            </a:r>
+            <a:r>
+              <a:rPr lang="en-US" sz="1200" b="0">
+                <a:solidFill>
+                  <a:srgbClr val="81755D"/>
+                </a:solidFill>
+                <a:effectLst/>
+                <a:latin typeface="Consolas" panose="020B0609020204030204" pitchFamily="49" charset="0"/>
+              </a:rPr>
+              <a:t>())</a:t>
+            </a:r>
+            <a:r>
+              <a:rPr lang="en-US" sz="1200" b="0">
+                <a:solidFill>
+                  <a:srgbClr val="F9E7C4"/>
+                </a:solidFill>
+                <a:effectLst/>
+                <a:latin typeface="Consolas" panose="020B0609020204030204" pitchFamily="49" charset="0"/>
+              </a:rPr>
+              <a:t> </a:t>
+            </a:r>
+            <a:r>
+              <a:rPr lang="en-US" sz="1200" b="0">
+                <a:solidFill>
+                  <a:srgbClr val="81755D"/>
+                </a:solidFill>
+                <a:effectLst/>
+                <a:latin typeface="Consolas" panose="020B0609020204030204" pitchFamily="49" charset="0"/>
+              </a:rPr>
+              <a:t>{</a:t>
+            </a:r>
+            <a:endParaRPr lang="en-US" sz="1200" b="0">
+              <a:solidFill>
+                <a:srgbClr val="F9E7C4"/>
+              </a:solidFill>
+              <a:effectLst/>
+              <a:latin typeface="Consolas" panose="020B0609020204030204" pitchFamily="49" charset="0"/>
+            </a:endParaRPr>
+          </a:p>
+          <a:p>
+            <a:r>
+              <a:rPr lang="en-US" sz="1200" b="0">
+                <a:solidFill>
+                  <a:srgbClr val="F9E7C4"/>
+                </a:solidFill>
+                <a:effectLst/>
+                <a:latin typeface="Consolas" panose="020B0609020204030204" pitchFamily="49" charset="0"/>
+              </a:rPr>
+              <a:t>            </a:t>
+            </a:r>
+            <a:r>
+              <a:rPr lang="en-US" sz="1200" b="0">
+                <a:solidFill>
+                  <a:srgbClr val="81755D"/>
+                </a:solidFill>
+                <a:effectLst/>
+                <a:latin typeface="Consolas" panose="020B0609020204030204" pitchFamily="49" charset="0"/>
+              </a:rPr>
+              <a:t>$</a:t>
+            </a:r>
+            <a:r>
+              <a:rPr lang="en-US" sz="1200" b="0">
+                <a:solidFill>
+                  <a:srgbClr val="FF0000"/>
+                </a:solidFill>
+                <a:effectLst/>
+                <a:latin typeface="Consolas" panose="020B0609020204030204" pitchFamily="49" charset="0"/>
+              </a:rPr>
+              <a:t>cartProducts</a:t>
+            </a:r>
+            <a:r>
+              <a:rPr lang="en-US" sz="1200" b="0">
+                <a:solidFill>
+                  <a:srgbClr val="F9E7C4"/>
+                </a:solidFill>
+                <a:effectLst/>
+                <a:latin typeface="Consolas" panose="020B0609020204030204" pitchFamily="49" charset="0"/>
+              </a:rPr>
+              <a:t> </a:t>
+            </a:r>
+            <a:r>
+              <a:rPr lang="en-US" sz="1200" b="0">
+                <a:solidFill>
+                  <a:srgbClr val="B294BB"/>
+                </a:solidFill>
+                <a:effectLst/>
+                <a:latin typeface="Consolas" panose="020B0609020204030204" pitchFamily="49" charset="0"/>
+              </a:rPr>
+              <a:t>=</a:t>
+            </a:r>
+            <a:r>
+              <a:rPr lang="en-US" sz="1200" b="0">
+                <a:solidFill>
+                  <a:srgbClr val="F9E7C4"/>
+                </a:solidFill>
+                <a:effectLst/>
+                <a:latin typeface="Consolas" panose="020B0609020204030204" pitchFamily="49" charset="0"/>
+              </a:rPr>
+              <a:t> </a:t>
+            </a:r>
+            <a:r>
+              <a:rPr lang="en-US" sz="1200" b="0">
+                <a:solidFill>
+                  <a:srgbClr val="F0C674"/>
+                </a:solidFill>
+                <a:effectLst/>
+                <a:latin typeface="Consolas" panose="020B0609020204030204" pitchFamily="49" charset="0"/>
+              </a:rPr>
+              <a:t>Cart</a:t>
+            </a:r>
+            <a:r>
+              <a:rPr lang="en-US" sz="1200" b="0">
+                <a:solidFill>
+                  <a:srgbClr val="B294BB"/>
+                </a:solidFill>
+                <a:effectLst/>
+                <a:latin typeface="Consolas" panose="020B0609020204030204" pitchFamily="49" charset="0"/>
+              </a:rPr>
+              <a:t>::</a:t>
+            </a:r>
+            <a:r>
+              <a:rPr lang="en-US" sz="1200" b="0">
+                <a:solidFill>
+                  <a:srgbClr val="81A2BE"/>
+                </a:solidFill>
+                <a:effectLst/>
+                <a:latin typeface="Consolas" panose="020B0609020204030204" pitchFamily="49" charset="0"/>
+              </a:rPr>
+              <a:t>with</a:t>
+            </a:r>
+            <a:r>
+              <a:rPr lang="en-US" sz="1200" b="0">
+                <a:solidFill>
+                  <a:srgbClr val="81755D"/>
+                </a:solidFill>
+                <a:effectLst/>
+                <a:latin typeface="Consolas" panose="020B0609020204030204" pitchFamily="49" charset="0"/>
+              </a:rPr>
+              <a:t>(['</a:t>
+            </a:r>
+            <a:r>
+              <a:rPr lang="en-US" sz="1200" b="0">
+                <a:solidFill>
+                  <a:srgbClr val="B5BD68"/>
+                </a:solidFill>
+                <a:effectLst/>
+                <a:latin typeface="Consolas" panose="020B0609020204030204" pitchFamily="49" charset="0"/>
+              </a:rPr>
+              <a:t>product</a:t>
+            </a:r>
+            <a:r>
+              <a:rPr lang="en-US" sz="1200" b="0">
+                <a:solidFill>
+                  <a:srgbClr val="81755D"/>
+                </a:solidFill>
+                <a:effectLst/>
+                <a:latin typeface="Consolas" panose="020B0609020204030204" pitchFamily="49" charset="0"/>
+              </a:rPr>
+              <a:t>'</a:t>
+            </a:r>
+            <a:r>
+              <a:rPr lang="en-US" sz="1200" b="0">
+                <a:solidFill>
+                  <a:srgbClr val="F9E7C4"/>
+                </a:solidFill>
+                <a:effectLst/>
+                <a:latin typeface="Consolas" panose="020B0609020204030204" pitchFamily="49" charset="0"/>
+              </a:rPr>
+              <a:t> </a:t>
+            </a:r>
+            <a:r>
+              <a:rPr lang="en-US" sz="1200" b="0">
+                <a:solidFill>
+                  <a:srgbClr val="B294BB"/>
+                </a:solidFill>
+                <a:effectLst/>
+                <a:latin typeface="Consolas" panose="020B0609020204030204" pitchFamily="49" charset="0"/>
+              </a:rPr>
+              <a:t>=&gt;</a:t>
+            </a:r>
+            <a:r>
+              <a:rPr lang="en-US" sz="1200" b="0">
+                <a:solidFill>
+                  <a:srgbClr val="F9E7C4"/>
+                </a:solidFill>
+                <a:effectLst/>
+                <a:latin typeface="Consolas" panose="020B0609020204030204" pitchFamily="49" charset="0"/>
+              </a:rPr>
+              <a:t> </a:t>
+            </a:r>
+            <a:r>
+              <a:rPr lang="en-US" sz="1200" b="0">
+                <a:solidFill>
+                  <a:srgbClr val="B294BB"/>
+                </a:solidFill>
+                <a:effectLst/>
+                <a:latin typeface="Consolas" panose="020B0609020204030204" pitchFamily="49" charset="0"/>
+              </a:rPr>
+              <a:t>function</a:t>
+            </a:r>
+            <a:r>
+              <a:rPr lang="en-US" sz="1200" b="0">
+                <a:solidFill>
+                  <a:srgbClr val="F9E7C4"/>
+                </a:solidFill>
+                <a:effectLst/>
+                <a:latin typeface="Consolas" panose="020B0609020204030204" pitchFamily="49" charset="0"/>
+              </a:rPr>
+              <a:t> </a:t>
+            </a:r>
+            <a:r>
+              <a:rPr lang="en-US" sz="1200" b="0">
+                <a:solidFill>
+                  <a:srgbClr val="81755D"/>
+                </a:solidFill>
+                <a:effectLst/>
+                <a:latin typeface="Consolas" panose="020B0609020204030204" pitchFamily="49" charset="0"/>
+              </a:rPr>
+              <a:t>($</a:t>
+            </a:r>
+            <a:r>
+              <a:rPr lang="en-US" sz="1200" b="0">
+                <a:solidFill>
+                  <a:schemeClr val="accent4">
+                    <a:lumMod val="75000"/>
+                  </a:schemeClr>
+                </a:solidFill>
+                <a:effectLst/>
+                <a:latin typeface="Consolas" panose="020B0609020204030204" pitchFamily="49" charset="0"/>
+              </a:rPr>
+              <a:t>query</a:t>
+            </a:r>
+            <a:r>
+              <a:rPr lang="en-US" sz="1200" b="0">
+                <a:solidFill>
+                  <a:srgbClr val="81755D"/>
+                </a:solidFill>
+                <a:effectLst/>
+                <a:latin typeface="Consolas" panose="020B0609020204030204" pitchFamily="49" charset="0"/>
+              </a:rPr>
+              <a:t>)</a:t>
+            </a:r>
+            <a:r>
+              <a:rPr lang="en-US" sz="1200" b="0">
+                <a:solidFill>
+                  <a:srgbClr val="F9E7C4"/>
+                </a:solidFill>
+                <a:effectLst/>
+                <a:latin typeface="Consolas" panose="020B0609020204030204" pitchFamily="49" charset="0"/>
+              </a:rPr>
+              <a:t> </a:t>
+            </a:r>
+            <a:r>
+              <a:rPr lang="en-US" sz="1200" b="0">
+                <a:solidFill>
+                  <a:srgbClr val="81755D"/>
+                </a:solidFill>
+                <a:effectLst/>
+                <a:latin typeface="Consolas" panose="020B0609020204030204" pitchFamily="49" charset="0"/>
+              </a:rPr>
+              <a:t>{</a:t>
+            </a:r>
+            <a:endParaRPr lang="en-US" sz="1200" b="0">
+              <a:solidFill>
+                <a:srgbClr val="F9E7C4"/>
+              </a:solidFill>
+              <a:effectLst/>
+              <a:latin typeface="Consolas" panose="020B0609020204030204" pitchFamily="49" charset="0"/>
+            </a:endParaRPr>
+          </a:p>
+          <a:p>
+            <a:r>
+              <a:rPr lang="en-US" sz="1200" b="0">
+                <a:solidFill>
+                  <a:srgbClr val="F9E7C4"/>
+                </a:solidFill>
+                <a:effectLst/>
+                <a:latin typeface="Consolas" panose="020B0609020204030204" pitchFamily="49" charset="0"/>
+              </a:rPr>
+              <a:t>                </a:t>
+            </a:r>
+            <a:r>
+              <a:rPr lang="en-US" sz="1200" b="0">
+                <a:solidFill>
+                  <a:srgbClr val="81755D"/>
+                </a:solidFill>
+                <a:effectLst/>
+                <a:latin typeface="Consolas" panose="020B0609020204030204" pitchFamily="49" charset="0"/>
+              </a:rPr>
+              <a:t>$</a:t>
+            </a:r>
+            <a:r>
+              <a:rPr lang="en-US" sz="1200" b="0">
+                <a:solidFill>
+                  <a:schemeClr val="accent4">
+                    <a:lumMod val="75000"/>
+                  </a:schemeClr>
+                </a:solidFill>
+                <a:effectLst/>
+                <a:latin typeface="Consolas" panose="020B0609020204030204" pitchFamily="49" charset="0"/>
+              </a:rPr>
+              <a:t>query-</a:t>
+            </a:r>
+            <a:r>
+              <a:rPr lang="en-US" sz="1200" b="0">
+                <a:solidFill>
+                  <a:srgbClr val="B294BB"/>
+                </a:solidFill>
+                <a:effectLst/>
+                <a:latin typeface="Consolas" panose="020B0609020204030204" pitchFamily="49" charset="0"/>
+              </a:rPr>
+              <a:t>&gt;</a:t>
+            </a:r>
+            <a:r>
+              <a:rPr lang="en-US" sz="1200" b="0">
+                <a:solidFill>
+                  <a:srgbClr val="81A2BE"/>
+                </a:solidFill>
+                <a:effectLst/>
+                <a:latin typeface="Consolas" panose="020B0609020204030204" pitchFamily="49" charset="0"/>
+              </a:rPr>
+              <a:t>select</a:t>
+            </a:r>
+            <a:r>
+              <a:rPr lang="en-US" sz="1200" b="0">
+                <a:solidFill>
+                  <a:srgbClr val="81755D"/>
+                </a:solidFill>
+                <a:effectLst/>
+                <a:latin typeface="Consolas" panose="020B0609020204030204" pitchFamily="49" charset="0"/>
+              </a:rPr>
+              <a:t>('</a:t>
+            </a:r>
+            <a:r>
+              <a:rPr lang="en-US" sz="1200" b="0">
+                <a:solidFill>
+                  <a:srgbClr val="B5BD68"/>
+                </a:solidFill>
+                <a:effectLst/>
+                <a:latin typeface="Consolas" panose="020B0609020204030204" pitchFamily="49" charset="0"/>
+              </a:rPr>
+              <a:t>id</a:t>
+            </a:r>
+            <a:r>
+              <a:rPr lang="en-US" sz="1200" b="0">
+                <a:solidFill>
+                  <a:srgbClr val="81755D"/>
+                </a:solidFill>
+                <a:effectLst/>
+                <a:latin typeface="Consolas" panose="020B0609020204030204" pitchFamily="49" charset="0"/>
+              </a:rPr>
+              <a:t>',</a:t>
+            </a:r>
+            <a:r>
+              <a:rPr lang="en-US" sz="1200" b="0">
+                <a:solidFill>
+                  <a:srgbClr val="F9E7C4"/>
+                </a:solidFill>
+                <a:effectLst/>
+                <a:latin typeface="Consolas" panose="020B0609020204030204" pitchFamily="49" charset="0"/>
+              </a:rPr>
+              <a:t> </a:t>
+            </a:r>
+            <a:r>
+              <a:rPr lang="en-US" sz="1200" b="0">
+                <a:solidFill>
+                  <a:srgbClr val="81755D"/>
+                </a:solidFill>
+                <a:effectLst/>
+                <a:latin typeface="Consolas" panose="020B0609020204030204" pitchFamily="49" charset="0"/>
+              </a:rPr>
+              <a:t>'</a:t>
+            </a:r>
+            <a:r>
+              <a:rPr lang="en-US" sz="1200" b="0">
+                <a:solidFill>
+                  <a:srgbClr val="B5BD68"/>
+                </a:solidFill>
+                <a:effectLst/>
+                <a:latin typeface="Consolas" panose="020B0609020204030204" pitchFamily="49" charset="0"/>
+              </a:rPr>
+              <a:t>name</a:t>
+            </a:r>
+            <a:r>
+              <a:rPr lang="en-US" sz="1200" b="0">
+                <a:solidFill>
+                  <a:srgbClr val="81755D"/>
+                </a:solidFill>
+                <a:effectLst/>
+                <a:latin typeface="Consolas" panose="020B0609020204030204" pitchFamily="49" charset="0"/>
+              </a:rPr>
+              <a:t>',</a:t>
+            </a:r>
+            <a:r>
+              <a:rPr lang="en-US" sz="1200" b="0">
+                <a:solidFill>
+                  <a:srgbClr val="F9E7C4"/>
+                </a:solidFill>
+                <a:effectLst/>
+                <a:latin typeface="Consolas" panose="020B0609020204030204" pitchFamily="49" charset="0"/>
+              </a:rPr>
+              <a:t> </a:t>
+            </a:r>
+            <a:r>
+              <a:rPr lang="en-US" sz="1200" b="0">
+                <a:solidFill>
+                  <a:srgbClr val="81755D"/>
+                </a:solidFill>
+                <a:effectLst/>
+                <a:latin typeface="Consolas" panose="020B0609020204030204" pitchFamily="49" charset="0"/>
+              </a:rPr>
+              <a:t>'</a:t>
+            </a:r>
+            <a:r>
+              <a:rPr lang="en-US" sz="1200" b="0">
+                <a:solidFill>
+                  <a:srgbClr val="B5BD68"/>
+                </a:solidFill>
+                <a:effectLst/>
+                <a:latin typeface="Consolas" panose="020B0609020204030204" pitchFamily="49" charset="0"/>
+              </a:rPr>
+              <a:t>photo</a:t>
+            </a:r>
+            <a:r>
+              <a:rPr lang="en-US" sz="1200" b="0">
+                <a:solidFill>
+                  <a:srgbClr val="81755D"/>
+                </a:solidFill>
+                <a:effectLst/>
+                <a:latin typeface="Consolas" panose="020B0609020204030204" pitchFamily="49" charset="0"/>
+              </a:rPr>
+              <a:t>',</a:t>
+            </a:r>
+            <a:r>
+              <a:rPr lang="en-US" sz="1200" b="0">
+                <a:solidFill>
+                  <a:srgbClr val="F9E7C4"/>
+                </a:solidFill>
+                <a:effectLst/>
+                <a:latin typeface="Consolas" panose="020B0609020204030204" pitchFamily="49" charset="0"/>
+              </a:rPr>
+              <a:t> </a:t>
+            </a:r>
+            <a:r>
+              <a:rPr lang="en-US" sz="1200" b="0">
+                <a:solidFill>
+                  <a:srgbClr val="81755D"/>
+                </a:solidFill>
+                <a:effectLst/>
+                <a:latin typeface="Consolas" panose="020B0609020204030204" pitchFamily="49" charset="0"/>
+              </a:rPr>
+              <a:t>'</a:t>
+            </a:r>
+            <a:r>
+              <a:rPr lang="en-US" sz="1200" b="0">
+                <a:solidFill>
+                  <a:srgbClr val="B5BD68"/>
+                </a:solidFill>
+                <a:effectLst/>
+                <a:latin typeface="Consolas" panose="020B0609020204030204" pitchFamily="49" charset="0"/>
+              </a:rPr>
+              <a:t>slug</a:t>
+            </a:r>
+            <a:r>
+              <a:rPr lang="en-US" sz="1200" b="0">
+                <a:solidFill>
+                  <a:srgbClr val="81755D"/>
+                </a:solidFill>
+                <a:effectLst/>
+                <a:latin typeface="Consolas" panose="020B0609020204030204" pitchFamily="49" charset="0"/>
+              </a:rPr>
+              <a:t>',</a:t>
+            </a:r>
+            <a:r>
+              <a:rPr lang="en-US" sz="1200" b="0">
+                <a:solidFill>
+                  <a:srgbClr val="F9E7C4"/>
+                </a:solidFill>
+                <a:effectLst/>
+                <a:latin typeface="Consolas" panose="020B0609020204030204" pitchFamily="49" charset="0"/>
+              </a:rPr>
+              <a:t> </a:t>
+            </a:r>
+            <a:r>
+              <a:rPr lang="en-US" sz="1200" b="0">
+                <a:solidFill>
+                  <a:srgbClr val="81755D"/>
+                </a:solidFill>
+                <a:effectLst/>
+                <a:latin typeface="Consolas" panose="020B0609020204030204" pitchFamily="49" charset="0"/>
+              </a:rPr>
+              <a:t>'</a:t>
+            </a:r>
+            <a:r>
+              <a:rPr lang="en-US" sz="1200" b="0">
+                <a:solidFill>
+                  <a:srgbClr val="B5BD68"/>
+                </a:solidFill>
+                <a:effectLst/>
+                <a:latin typeface="Consolas" panose="020B0609020204030204" pitchFamily="49" charset="0"/>
+              </a:rPr>
+              <a:t>price</a:t>
+            </a:r>
+            <a:r>
+              <a:rPr lang="en-US" sz="1200" b="0">
+                <a:solidFill>
+                  <a:srgbClr val="81755D"/>
+                </a:solidFill>
+                <a:effectLst/>
+                <a:latin typeface="Consolas" panose="020B0609020204030204" pitchFamily="49" charset="0"/>
+              </a:rPr>
+              <a:t>',</a:t>
+            </a:r>
+            <a:r>
+              <a:rPr lang="en-US" sz="1200" b="0">
+                <a:solidFill>
+                  <a:srgbClr val="F9E7C4"/>
+                </a:solidFill>
+                <a:effectLst/>
+                <a:latin typeface="Consolas" panose="020B0609020204030204" pitchFamily="49" charset="0"/>
+              </a:rPr>
+              <a:t> </a:t>
+            </a:r>
+            <a:r>
+              <a:rPr lang="en-US" sz="1200" b="0">
+                <a:solidFill>
+                  <a:srgbClr val="81755D"/>
+                </a:solidFill>
+                <a:effectLst/>
+                <a:latin typeface="Consolas" panose="020B0609020204030204" pitchFamily="49" charset="0"/>
+              </a:rPr>
+              <a:t>'</a:t>
+            </a:r>
+            <a:r>
+              <a:rPr lang="en-US" sz="1200" b="0">
+                <a:solidFill>
+                  <a:srgbClr val="B5BD68"/>
+                </a:solidFill>
+                <a:effectLst/>
+                <a:latin typeface="Consolas" panose="020B0609020204030204" pitchFamily="49" charset="0"/>
+              </a:rPr>
+              <a:t>stock</a:t>
+            </a:r>
+            <a:r>
+              <a:rPr lang="en-US" sz="1200" b="0">
+                <a:solidFill>
+                  <a:srgbClr val="81755D"/>
+                </a:solidFill>
+                <a:effectLst/>
+                <a:latin typeface="Consolas" panose="020B0609020204030204" pitchFamily="49" charset="0"/>
+              </a:rPr>
+              <a:t>');</a:t>
+            </a:r>
+            <a:endParaRPr lang="en-US" sz="1200" b="0">
+              <a:solidFill>
+                <a:srgbClr val="F9E7C4"/>
+              </a:solidFill>
+              <a:effectLst/>
+              <a:latin typeface="Consolas" panose="020B0609020204030204" pitchFamily="49" charset="0"/>
+            </a:endParaRPr>
+          </a:p>
+          <a:p>
+            <a:r>
+              <a:rPr lang="en-US" sz="1200" b="0">
+                <a:solidFill>
+                  <a:srgbClr val="F9E7C4"/>
+                </a:solidFill>
+                <a:effectLst/>
+                <a:latin typeface="Consolas" panose="020B0609020204030204" pitchFamily="49" charset="0"/>
+              </a:rPr>
+              <a:t>            </a:t>
+            </a:r>
+            <a:r>
+              <a:rPr lang="en-US" sz="1200" b="0">
+                <a:solidFill>
+                  <a:srgbClr val="81755D"/>
+                </a:solidFill>
+                <a:effectLst/>
+                <a:latin typeface="Consolas" panose="020B0609020204030204" pitchFamily="49" charset="0"/>
+              </a:rPr>
+              <a:t>}])</a:t>
+            </a:r>
+            <a:r>
+              <a:rPr lang="en-US" sz="1200" b="0">
+                <a:solidFill>
+                  <a:srgbClr val="B294BB"/>
+                </a:solidFill>
+                <a:effectLst/>
+                <a:latin typeface="Consolas" panose="020B0609020204030204" pitchFamily="49" charset="0"/>
+              </a:rPr>
+              <a:t>-&gt;</a:t>
+            </a:r>
+            <a:r>
+              <a:rPr lang="en-US" sz="1200" b="0">
+                <a:solidFill>
+                  <a:srgbClr val="81A2BE"/>
+                </a:solidFill>
+                <a:effectLst/>
+                <a:latin typeface="Consolas" panose="020B0609020204030204" pitchFamily="49" charset="0"/>
+              </a:rPr>
+              <a:t>where</a:t>
+            </a:r>
+            <a:r>
+              <a:rPr lang="en-US" sz="1200" b="0">
+                <a:solidFill>
+                  <a:srgbClr val="81755D"/>
+                </a:solidFill>
+                <a:effectLst/>
+                <a:latin typeface="Consolas" panose="020B0609020204030204" pitchFamily="49" charset="0"/>
+              </a:rPr>
+              <a:t>('</a:t>
+            </a:r>
+            <a:r>
+              <a:rPr lang="en-US" sz="1200" b="0">
+                <a:solidFill>
+                  <a:srgbClr val="B5BD68"/>
+                </a:solidFill>
+                <a:effectLst/>
+                <a:latin typeface="Consolas" panose="020B0609020204030204" pitchFamily="49" charset="0"/>
+              </a:rPr>
+              <a:t>user_id</a:t>
+            </a:r>
+            <a:r>
+              <a:rPr lang="en-US" sz="1200" b="0">
+                <a:solidFill>
+                  <a:srgbClr val="81755D"/>
+                </a:solidFill>
+                <a:effectLst/>
+                <a:latin typeface="Consolas" panose="020B0609020204030204" pitchFamily="49" charset="0"/>
+              </a:rPr>
+              <a:t>',</a:t>
+            </a:r>
+            <a:r>
+              <a:rPr lang="en-US" sz="1200" b="0">
+                <a:solidFill>
+                  <a:srgbClr val="F9E7C4"/>
+                </a:solidFill>
+                <a:effectLst/>
+                <a:latin typeface="Consolas" panose="020B0609020204030204" pitchFamily="49" charset="0"/>
+              </a:rPr>
+              <a:t> </a:t>
+            </a:r>
+            <a:r>
+              <a:rPr lang="en-US" sz="1200" b="0">
+                <a:solidFill>
+                  <a:srgbClr val="F0C674"/>
+                </a:solidFill>
+                <a:effectLst/>
+                <a:latin typeface="Consolas" panose="020B0609020204030204" pitchFamily="49" charset="0"/>
+              </a:rPr>
+              <a:t>Auth</a:t>
+            </a:r>
+            <a:r>
+              <a:rPr lang="en-US" sz="1200" b="0">
+                <a:solidFill>
+                  <a:srgbClr val="B294BB"/>
+                </a:solidFill>
+                <a:effectLst/>
+                <a:latin typeface="Consolas" panose="020B0609020204030204" pitchFamily="49" charset="0"/>
+              </a:rPr>
+              <a:t>::</a:t>
+            </a:r>
+            <a:r>
+              <a:rPr lang="en-US" sz="1200" b="0">
+                <a:solidFill>
+                  <a:srgbClr val="81A2BE"/>
+                </a:solidFill>
+                <a:effectLst/>
+                <a:latin typeface="Consolas" panose="020B0609020204030204" pitchFamily="49" charset="0"/>
+              </a:rPr>
+              <a:t>id</a:t>
+            </a:r>
+            <a:r>
+              <a:rPr lang="en-US" sz="1200" b="0">
+                <a:solidFill>
+                  <a:srgbClr val="81755D"/>
+                </a:solidFill>
+                <a:effectLst/>
+                <a:latin typeface="Consolas" panose="020B0609020204030204" pitchFamily="49" charset="0"/>
+              </a:rPr>
+              <a:t>())</a:t>
+            </a:r>
+            <a:r>
+              <a:rPr lang="en-US" sz="1200" b="0">
+                <a:solidFill>
+                  <a:srgbClr val="B294BB"/>
+                </a:solidFill>
+                <a:effectLst/>
+                <a:latin typeface="Consolas" panose="020B0609020204030204" pitchFamily="49" charset="0"/>
+              </a:rPr>
+              <a:t>-&gt;</a:t>
+            </a:r>
+            <a:r>
+              <a:rPr lang="en-US" sz="1200" b="0">
+                <a:solidFill>
+                  <a:srgbClr val="81A2BE"/>
+                </a:solidFill>
+                <a:effectLst/>
+                <a:latin typeface="Consolas" panose="020B0609020204030204" pitchFamily="49" charset="0"/>
+              </a:rPr>
+              <a:t>orderByDesc</a:t>
+            </a:r>
+            <a:r>
+              <a:rPr lang="en-US" sz="1200" b="0">
+                <a:solidFill>
+                  <a:srgbClr val="81755D"/>
+                </a:solidFill>
+                <a:effectLst/>
+                <a:latin typeface="Consolas" panose="020B0609020204030204" pitchFamily="49" charset="0"/>
+              </a:rPr>
+              <a:t>('</a:t>
+            </a:r>
+            <a:r>
+              <a:rPr lang="en-US" sz="1200" b="0">
+                <a:solidFill>
+                  <a:srgbClr val="B5BD68"/>
+                </a:solidFill>
+                <a:effectLst/>
+                <a:latin typeface="Consolas" panose="020B0609020204030204" pitchFamily="49" charset="0"/>
+              </a:rPr>
+              <a:t>created_at</a:t>
+            </a:r>
+            <a:r>
+              <a:rPr lang="en-US" sz="1200" b="0">
+                <a:solidFill>
+                  <a:srgbClr val="81755D"/>
+                </a:solidFill>
+                <a:effectLst/>
+                <a:latin typeface="Consolas" panose="020B0609020204030204" pitchFamily="49" charset="0"/>
+              </a:rPr>
+              <a:t>')</a:t>
+            </a:r>
+            <a:r>
+              <a:rPr lang="en-US" sz="1200" b="0">
+                <a:solidFill>
+                  <a:srgbClr val="B294BB"/>
+                </a:solidFill>
+                <a:effectLst/>
+                <a:latin typeface="Consolas" panose="020B0609020204030204" pitchFamily="49" charset="0"/>
+              </a:rPr>
+              <a:t>-&gt;</a:t>
+            </a:r>
+            <a:r>
+              <a:rPr lang="en-US" sz="1200" b="0">
+                <a:solidFill>
+                  <a:srgbClr val="81A2BE"/>
+                </a:solidFill>
+                <a:effectLst/>
+                <a:latin typeface="Consolas" panose="020B0609020204030204" pitchFamily="49" charset="0"/>
+              </a:rPr>
+              <a:t>get</a:t>
+            </a:r>
+            <a:r>
+              <a:rPr lang="en-US" sz="1200" b="0">
+                <a:solidFill>
+                  <a:srgbClr val="81755D"/>
+                </a:solidFill>
+                <a:effectLst/>
+                <a:latin typeface="Consolas" panose="020B0609020204030204" pitchFamily="49" charset="0"/>
+              </a:rPr>
+              <a:t>();</a:t>
+            </a:r>
+            <a:endParaRPr lang="en-US" sz="1200" b="0">
+              <a:solidFill>
+                <a:srgbClr val="F9E7C4"/>
+              </a:solidFill>
+              <a:effectLst/>
+              <a:latin typeface="Consolas" panose="020B0609020204030204" pitchFamily="49" charset="0"/>
+            </a:endParaRPr>
+          </a:p>
+          <a:p>
+            <a:r>
+              <a:rPr lang="en-US" sz="1200" b="0">
+                <a:solidFill>
+                  <a:srgbClr val="F9E7C4"/>
+                </a:solidFill>
+                <a:effectLst/>
+                <a:latin typeface="Consolas" panose="020B0609020204030204" pitchFamily="49" charset="0"/>
+              </a:rPr>
+              <a:t>        </a:t>
+            </a:r>
+            <a:r>
+              <a:rPr lang="en-US" sz="1200" b="0">
+                <a:solidFill>
+                  <a:srgbClr val="81755D"/>
+                </a:solidFill>
+                <a:effectLst/>
+                <a:latin typeface="Consolas" panose="020B0609020204030204" pitchFamily="49" charset="0"/>
+              </a:rPr>
+              <a:t>}</a:t>
+            </a:r>
+            <a:r>
+              <a:rPr lang="en-US" sz="1200" b="0">
+                <a:solidFill>
+                  <a:srgbClr val="F9E7C4"/>
+                </a:solidFill>
+                <a:effectLst/>
+                <a:latin typeface="Consolas" panose="020B0609020204030204" pitchFamily="49" charset="0"/>
+              </a:rPr>
+              <a:t> </a:t>
+            </a:r>
+            <a:r>
+              <a:rPr lang="en-US" sz="1200" b="0">
+                <a:solidFill>
+                  <a:srgbClr val="B294BB"/>
+                </a:solidFill>
+                <a:effectLst/>
+                <a:latin typeface="Consolas" panose="020B0609020204030204" pitchFamily="49" charset="0"/>
+              </a:rPr>
+              <a:t>else</a:t>
+            </a:r>
+            <a:r>
+              <a:rPr lang="en-US" sz="1200" b="0">
+                <a:solidFill>
+                  <a:srgbClr val="F9E7C4"/>
+                </a:solidFill>
+                <a:effectLst/>
+                <a:latin typeface="Consolas" panose="020B0609020204030204" pitchFamily="49" charset="0"/>
+              </a:rPr>
+              <a:t> </a:t>
+            </a:r>
+            <a:r>
+              <a:rPr lang="en-US" sz="1200" b="0">
+                <a:solidFill>
+                  <a:srgbClr val="81755D"/>
+                </a:solidFill>
+                <a:effectLst/>
+                <a:latin typeface="Consolas" panose="020B0609020204030204" pitchFamily="49" charset="0"/>
+              </a:rPr>
+              <a:t>{</a:t>
+            </a:r>
+            <a:endParaRPr lang="en-US" sz="1200" b="0">
+              <a:solidFill>
+                <a:srgbClr val="F9E7C4"/>
+              </a:solidFill>
+              <a:effectLst/>
+              <a:latin typeface="Consolas" panose="020B0609020204030204" pitchFamily="49" charset="0"/>
+            </a:endParaRPr>
+          </a:p>
+          <a:p>
+            <a:r>
+              <a:rPr lang="en-US" sz="1200" b="0">
+                <a:solidFill>
+                  <a:srgbClr val="F9E7C4"/>
+                </a:solidFill>
+                <a:effectLst/>
+                <a:latin typeface="Consolas" panose="020B0609020204030204" pitchFamily="49" charset="0"/>
+              </a:rPr>
+              <a:t>            </a:t>
+            </a:r>
+            <a:r>
+              <a:rPr lang="en-US" sz="1200" b="0">
+                <a:solidFill>
+                  <a:srgbClr val="81755D"/>
+                </a:solidFill>
+                <a:effectLst/>
+                <a:latin typeface="Consolas" panose="020B0609020204030204" pitchFamily="49" charset="0"/>
+              </a:rPr>
+              <a:t>$</a:t>
+            </a:r>
+            <a:r>
+              <a:rPr lang="en-US" sz="1200" b="0">
+                <a:solidFill>
+                  <a:srgbClr val="FF0000"/>
+                </a:solidFill>
+                <a:effectLst/>
+                <a:latin typeface="Consolas" panose="020B0609020204030204" pitchFamily="49" charset="0"/>
+              </a:rPr>
+              <a:t>cartProducts</a:t>
+            </a:r>
+            <a:r>
+              <a:rPr lang="en-US" sz="1200" b="0">
+                <a:solidFill>
+                  <a:srgbClr val="F9E7C4"/>
+                </a:solidFill>
+                <a:effectLst/>
+                <a:latin typeface="Consolas" panose="020B0609020204030204" pitchFamily="49" charset="0"/>
+              </a:rPr>
+              <a:t> </a:t>
+            </a:r>
+            <a:r>
+              <a:rPr lang="en-US" sz="1200" b="0">
+                <a:solidFill>
+                  <a:srgbClr val="B294BB"/>
+                </a:solidFill>
+                <a:effectLst/>
+                <a:latin typeface="Consolas" panose="020B0609020204030204" pitchFamily="49" charset="0"/>
+              </a:rPr>
+              <a:t>=</a:t>
+            </a:r>
+            <a:r>
+              <a:rPr lang="en-US" sz="1200" b="0">
+                <a:solidFill>
+                  <a:srgbClr val="F9E7C4"/>
+                </a:solidFill>
+                <a:effectLst/>
+                <a:latin typeface="Consolas" panose="020B0609020204030204" pitchFamily="49" charset="0"/>
+              </a:rPr>
+              <a:t> </a:t>
+            </a:r>
+            <a:r>
+              <a:rPr lang="en-US" sz="1200" b="0">
+                <a:solidFill>
+                  <a:srgbClr val="F0C674"/>
+                </a:solidFill>
+                <a:effectLst/>
+                <a:latin typeface="Consolas" panose="020B0609020204030204" pitchFamily="49" charset="0"/>
+              </a:rPr>
+              <a:t>Cart</a:t>
+            </a:r>
+            <a:r>
+              <a:rPr lang="en-US" sz="1200" b="0">
+                <a:solidFill>
+                  <a:srgbClr val="B294BB"/>
+                </a:solidFill>
+                <a:effectLst/>
+                <a:latin typeface="Consolas" panose="020B0609020204030204" pitchFamily="49" charset="0"/>
+              </a:rPr>
+              <a:t>::</a:t>
+            </a:r>
+            <a:r>
+              <a:rPr lang="en-US" sz="1200" b="0">
+                <a:solidFill>
+                  <a:srgbClr val="81A2BE"/>
+                </a:solidFill>
+                <a:effectLst/>
+                <a:latin typeface="Consolas" panose="020B0609020204030204" pitchFamily="49" charset="0"/>
+              </a:rPr>
+              <a:t>with</a:t>
+            </a:r>
+            <a:r>
+              <a:rPr lang="en-US" sz="1200" b="0">
+                <a:solidFill>
+                  <a:srgbClr val="81755D"/>
+                </a:solidFill>
+                <a:effectLst/>
+                <a:latin typeface="Consolas" panose="020B0609020204030204" pitchFamily="49" charset="0"/>
+              </a:rPr>
+              <a:t>(['</a:t>
+            </a:r>
+            <a:r>
+              <a:rPr lang="en-US" sz="1200" b="0">
+                <a:solidFill>
+                  <a:srgbClr val="B5BD68"/>
+                </a:solidFill>
+                <a:effectLst/>
+                <a:latin typeface="Consolas" panose="020B0609020204030204" pitchFamily="49" charset="0"/>
+              </a:rPr>
+              <a:t>product</a:t>
+            </a:r>
+            <a:r>
+              <a:rPr lang="en-US" sz="1200" b="0">
+                <a:solidFill>
+                  <a:srgbClr val="81755D"/>
+                </a:solidFill>
+                <a:effectLst/>
+                <a:latin typeface="Consolas" panose="020B0609020204030204" pitchFamily="49" charset="0"/>
+              </a:rPr>
+              <a:t>'</a:t>
+            </a:r>
+            <a:r>
+              <a:rPr lang="en-US" sz="1200" b="0">
+                <a:solidFill>
+                  <a:srgbClr val="F9E7C4"/>
+                </a:solidFill>
+                <a:effectLst/>
+                <a:latin typeface="Consolas" panose="020B0609020204030204" pitchFamily="49" charset="0"/>
+              </a:rPr>
+              <a:t> </a:t>
+            </a:r>
+            <a:r>
+              <a:rPr lang="en-US" sz="1200" b="0">
+                <a:solidFill>
+                  <a:srgbClr val="B294BB"/>
+                </a:solidFill>
+                <a:effectLst/>
+                <a:latin typeface="Consolas" panose="020B0609020204030204" pitchFamily="49" charset="0"/>
+              </a:rPr>
+              <a:t>=&gt;</a:t>
+            </a:r>
+            <a:r>
+              <a:rPr lang="en-US" sz="1200" b="0">
+                <a:solidFill>
+                  <a:srgbClr val="F9E7C4"/>
+                </a:solidFill>
+                <a:effectLst/>
+                <a:latin typeface="Consolas" panose="020B0609020204030204" pitchFamily="49" charset="0"/>
+              </a:rPr>
+              <a:t> </a:t>
+            </a:r>
+            <a:r>
+              <a:rPr lang="en-US" sz="1200" b="0">
+                <a:solidFill>
+                  <a:srgbClr val="B294BB"/>
+                </a:solidFill>
+                <a:effectLst/>
+                <a:latin typeface="Consolas" panose="020B0609020204030204" pitchFamily="49" charset="0"/>
+              </a:rPr>
+              <a:t>function</a:t>
+            </a:r>
+            <a:r>
+              <a:rPr lang="en-US" sz="1200" b="0">
+                <a:solidFill>
+                  <a:srgbClr val="F9E7C4"/>
+                </a:solidFill>
+                <a:effectLst/>
+                <a:latin typeface="Consolas" panose="020B0609020204030204" pitchFamily="49" charset="0"/>
+              </a:rPr>
+              <a:t> </a:t>
+            </a:r>
+            <a:r>
+              <a:rPr lang="en-US" sz="1200" b="0">
+                <a:solidFill>
+                  <a:srgbClr val="81755D"/>
+                </a:solidFill>
+                <a:effectLst/>
+                <a:latin typeface="Consolas" panose="020B0609020204030204" pitchFamily="49" charset="0"/>
+              </a:rPr>
+              <a:t>($</a:t>
+            </a:r>
+            <a:r>
+              <a:rPr lang="en-US" sz="1200" b="0">
+                <a:solidFill>
+                  <a:schemeClr val="accent4">
+                    <a:lumMod val="75000"/>
+                  </a:schemeClr>
+                </a:solidFill>
+                <a:effectLst/>
+                <a:latin typeface="Consolas" panose="020B0609020204030204" pitchFamily="49" charset="0"/>
+              </a:rPr>
+              <a:t>query</a:t>
+            </a:r>
+            <a:r>
+              <a:rPr lang="en-US" sz="1200" b="0">
+                <a:solidFill>
+                  <a:srgbClr val="81755D"/>
+                </a:solidFill>
+                <a:effectLst/>
+                <a:latin typeface="Consolas" panose="020B0609020204030204" pitchFamily="49" charset="0"/>
+              </a:rPr>
+              <a:t>)</a:t>
+            </a:r>
+            <a:r>
+              <a:rPr lang="en-US" sz="1200" b="0">
+                <a:solidFill>
+                  <a:srgbClr val="F9E7C4"/>
+                </a:solidFill>
+                <a:effectLst/>
+                <a:latin typeface="Consolas" panose="020B0609020204030204" pitchFamily="49" charset="0"/>
+              </a:rPr>
+              <a:t> </a:t>
+            </a:r>
+            <a:r>
+              <a:rPr lang="en-US" sz="1200" b="0">
+                <a:solidFill>
+                  <a:srgbClr val="81755D"/>
+                </a:solidFill>
+                <a:effectLst/>
+                <a:latin typeface="Consolas" panose="020B0609020204030204" pitchFamily="49" charset="0"/>
+              </a:rPr>
+              <a:t>{</a:t>
+            </a:r>
+            <a:endParaRPr lang="en-US" sz="1200" b="0">
+              <a:solidFill>
+                <a:srgbClr val="F9E7C4"/>
+              </a:solidFill>
+              <a:effectLst/>
+              <a:latin typeface="Consolas" panose="020B0609020204030204" pitchFamily="49" charset="0"/>
+            </a:endParaRPr>
+          </a:p>
+          <a:p>
+            <a:r>
+              <a:rPr lang="en-US" sz="1200" b="0">
+                <a:solidFill>
+                  <a:srgbClr val="F9E7C4"/>
+                </a:solidFill>
+                <a:effectLst/>
+                <a:latin typeface="Consolas" panose="020B0609020204030204" pitchFamily="49" charset="0"/>
+              </a:rPr>
+              <a:t>                </a:t>
+            </a:r>
+            <a:r>
+              <a:rPr lang="en-US" sz="1200" b="0">
+                <a:solidFill>
+                  <a:srgbClr val="81755D"/>
+                </a:solidFill>
+                <a:effectLst/>
+                <a:latin typeface="Consolas" panose="020B0609020204030204" pitchFamily="49" charset="0"/>
+              </a:rPr>
+              <a:t>$</a:t>
+            </a:r>
+            <a:r>
+              <a:rPr lang="en-US" sz="1200" b="0">
+                <a:solidFill>
+                  <a:schemeClr val="accent4">
+                    <a:lumMod val="75000"/>
+                  </a:schemeClr>
+                </a:solidFill>
+                <a:effectLst/>
+                <a:latin typeface="Consolas" panose="020B0609020204030204" pitchFamily="49" charset="0"/>
+              </a:rPr>
+              <a:t>query-</a:t>
+            </a:r>
+            <a:r>
+              <a:rPr lang="en-US" sz="1200" b="0">
+                <a:solidFill>
+                  <a:srgbClr val="B294BB"/>
+                </a:solidFill>
+                <a:effectLst/>
+                <a:latin typeface="Consolas" panose="020B0609020204030204" pitchFamily="49" charset="0"/>
+              </a:rPr>
+              <a:t>&gt;</a:t>
+            </a:r>
+            <a:r>
+              <a:rPr lang="en-US" sz="1200" b="0">
+                <a:solidFill>
+                  <a:srgbClr val="81A2BE"/>
+                </a:solidFill>
+                <a:effectLst/>
+                <a:latin typeface="Consolas" panose="020B0609020204030204" pitchFamily="49" charset="0"/>
+              </a:rPr>
+              <a:t>select</a:t>
+            </a:r>
+            <a:r>
+              <a:rPr lang="en-US" sz="1200" b="0">
+                <a:solidFill>
+                  <a:srgbClr val="81755D"/>
+                </a:solidFill>
+                <a:effectLst/>
+                <a:latin typeface="Consolas" panose="020B0609020204030204" pitchFamily="49" charset="0"/>
+              </a:rPr>
+              <a:t>('</a:t>
+            </a:r>
+            <a:r>
+              <a:rPr lang="en-US" sz="1200" b="0">
+                <a:solidFill>
+                  <a:srgbClr val="B5BD68"/>
+                </a:solidFill>
+                <a:effectLst/>
+                <a:latin typeface="Consolas" panose="020B0609020204030204" pitchFamily="49" charset="0"/>
+              </a:rPr>
+              <a:t>id</a:t>
+            </a:r>
+            <a:r>
+              <a:rPr lang="en-US" sz="1200" b="0">
+                <a:solidFill>
+                  <a:srgbClr val="81755D"/>
+                </a:solidFill>
+                <a:effectLst/>
+                <a:latin typeface="Consolas" panose="020B0609020204030204" pitchFamily="49" charset="0"/>
+              </a:rPr>
+              <a:t>',</a:t>
+            </a:r>
+            <a:r>
+              <a:rPr lang="en-US" sz="1200" b="0">
+                <a:solidFill>
+                  <a:srgbClr val="F9E7C4"/>
+                </a:solidFill>
+                <a:effectLst/>
+                <a:latin typeface="Consolas" panose="020B0609020204030204" pitchFamily="49" charset="0"/>
+              </a:rPr>
+              <a:t> </a:t>
+            </a:r>
+            <a:r>
+              <a:rPr lang="en-US" sz="1200" b="0">
+                <a:solidFill>
+                  <a:srgbClr val="81755D"/>
+                </a:solidFill>
+                <a:effectLst/>
+                <a:latin typeface="Consolas" panose="020B0609020204030204" pitchFamily="49" charset="0"/>
+              </a:rPr>
+              <a:t>'</a:t>
+            </a:r>
+            <a:r>
+              <a:rPr lang="en-US" sz="1200" b="0">
+                <a:solidFill>
+                  <a:srgbClr val="B5BD68"/>
+                </a:solidFill>
+                <a:effectLst/>
+                <a:latin typeface="Consolas" panose="020B0609020204030204" pitchFamily="49" charset="0"/>
+              </a:rPr>
+              <a:t>name</a:t>
+            </a:r>
+            <a:r>
+              <a:rPr lang="en-US" sz="1200" b="0">
+                <a:solidFill>
+                  <a:srgbClr val="81755D"/>
+                </a:solidFill>
+                <a:effectLst/>
+                <a:latin typeface="Consolas" panose="020B0609020204030204" pitchFamily="49" charset="0"/>
+              </a:rPr>
+              <a:t>',</a:t>
+            </a:r>
+            <a:r>
+              <a:rPr lang="en-US" sz="1200" b="0">
+                <a:solidFill>
+                  <a:srgbClr val="F9E7C4"/>
+                </a:solidFill>
+                <a:effectLst/>
+                <a:latin typeface="Consolas" panose="020B0609020204030204" pitchFamily="49" charset="0"/>
+              </a:rPr>
+              <a:t> </a:t>
+            </a:r>
+            <a:r>
+              <a:rPr lang="en-US" sz="1200" b="0">
+                <a:solidFill>
+                  <a:srgbClr val="81755D"/>
+                </a:solidFill>
+                <a:effectLst/>
+                <a:latin typeface="Consolas" panose="020B0609020204030204" pitchFamily="49" charset="0"/>
+              </a:rPr>
+              <a:t>'</a:t>
+            </a:r>
+            <a:r>
+              <a:rPr lang="en-US" sz="1200" b="0">
+                <a:solidFill>
+                  <a:srgbClr val="B5BD68"/>
+                </a:solidFill>
+                <a:effectLst/>
+                <a:latin typeface="Consolas" panose="020B0609020204030204" pitchFamily="49" charset="0"/>
+              </a:rPr>
+              <a:t>slug</a:t>
+            </a:r>
+            <a:r>
+              <a:rPr lang="en-US" sz="1200" b="0">
+                <a:solidFill>
+                  <a:srgbClr val="81755D"/>
+                </a:solidFill>
+                <a:effectLst/>
+                <a:latin typeface="Consolas" panose="020B0609020204030204" pitchFamily="49" charset="0"/>
+              </a:rPr>
+              <a:t>',</a:t>
+            </a:r>
+            <a:r>
+              <a:rPr lang="en-US" sz="1200" b="0">
+                <a:solidFill>
+                  <a:srgbClr val="F9E7C4"/>
+                </a:solidFill>
+                <a:effectLst/>
+                <a:latin typeface="Consolas" panose="020B0609020204030204" pitchFamily="49" charset="0"/>
+              </a:rPr>
+              <a:t> </a:t>
+            </a:r>
+            <a:r>
+              <a:rPr lang="en-US" sz="1200" b="0">
+                <a:solidFill>
+                  <a:srgbClr val="81755D"/>
+                </a:solidFill>
+                <a:effectLst/>
+                <a:latin typeface="Consolas" panose="020B0609020204030204" pitchFamily="49" charset="0"/>
+              </a:rPr>
+              <a:t>'</a:t>
+            </a:r>
+            <a:r>
+              <a:rPr lang="en-US" sz="1200" b="0">
+                <a:solidFill>
+                  <a:srgbClr val="B5BD68"/>
+                </a:solidFill>
+                <a:effectLst/>
+                <a:latin typeface="Consolas" panose="020B0609020204030204" pitchFamily="49" charset="0"/>
+              </a:rPr>
+              <a:t>photo</a:t>
+            </a:r>
+            <a:r>
+              <a:rPr lang="en-US" sz="1200" b="0">
+                <a:solidFill>
+                  <a:srgbClr val="81755D"/>
+                </a:solidFill>
+                <a:effectLst/>
+                <a:latin typeface="Consolas" panose="020B0609020204030204" pitchFamily="49" charset="0"/>
+              </a:rPr>
+              <a:t>',</a:t>
+            </a:r>
+            <a:r>
+              <a:rPr lang="en-US" sz="1200" b="0">
+                <a:solidFill>
+                  <a:srgbClr val="F9E7C4"/>
+                </a:solidFill>
+                <a:effectLst/>
+                <a:latin typeface="Consolas" panose="020B0609020204030204" pitchFamily="49" charset="0"/>
+              </a:rPr>
+              <a:t> </a:t>
+            </a:r>
+            <a:r>
+              <a:rPr lang="en-US" sz="1200" b="0">
+                <a:solidFill>
+                  <a:srgbClr val="81755D"/>
+                </a:solidFill>
+                <a:effectLst/>
+                <a:latin typeface="Consolas" panose="020B0609020204030204" pitchFamily="49" charset="0"/>
+              </a:rPr>
+              <a:t>'</a:t>
+            </a:r>
+            <a:r>
+              <a:rPr lang="en-US" sz="1200" b="0">
+                <a:solidFill>
+                  <a:srgbClr val="B5BD68"/>
+                </a:solidFill>
+                <a:effectLst/>
+                <a:latin typeface="Consolas" panose="020B0609020204030204" pitchFamily="49" charset="0"/>
+              </a:rPr>
+              <a:t>price</a:t>
+            </a:r>
+            <a:r>
+              <a:rPr lang="en-US" sz="1200" b="0">
+                <a:solidFill>
+                  <a:srgbClr val="81755D"/>
+                </a:solidFill>
+                <a:effectLst/>
+                <a:latin typeface="Consolas" panose="020B0609020204030204" pitchFamily="49" charset="0"/>
+              </a:rPr>
+              <a:t>',</a:t>
+            </a:r>
+            <a:r>
+              <a:rPr lang="en-US" sz="1200" b="0">
+                <a:solidFill>
+                  <a:srgbClr val="F9E7C4"/>
+                </a:solidFill>
+                <a:effectLst/>
+                <a:latin typeface="Consolas" panose="020B0609020204030204" pitchFamily="49" charset="0"/>
+              </a:rPr>
+              <a:t> </a:t>
+            </a:r>
+            <a:r>
+              <a:rPr lang="en-US" sz="1200" b="0">
+                <a:solidFill>
+                  <a:srgbClr val="81755D"/>
+                </a:solidFill>
+                <a:effectLst/>
+                <a:latin typeface="Consolas" panose="020B0609020204030204" pitchFamily="49" charset="0"/>
+              </a:rPr>
+              <a:t>'</a:t>
+            </a:r>
+            <a:r>
+              <a:rPr lang="en-US" sz="1200" b="0">
+                <a:solidFill>
+                  <a:srgbClr val="B5BD68"/>
+                </a:solidFill>
+                <a:effectLst/>
+                <a:latin typeface="Consolas" panose="020B0609020204030204" pitchFamily="49" charset="0"/>
+              </a:rPr>
+              <a:t>stock</a:t>
+            </a:r>
+            <a:r>
+              <a:rPr lang="en-US" sz="1200" b="0">
+                <a:solidFill>
+                  <a:srgbClr val="81755D"/>
+                </a:solidFill>
+                <a:effectLst/>
+                <a:latin typeface="Consolas" panose="020B0609020204030204" pitchFamily="49" charset="0"/>
+              </a:rPr>
+              <a:t>');</a:t>
+            </a:r>
+            <a:endParaRPr lang="en-US" sz="1200" b="0">
+              <a:solidFill>
+                <a:srgbClr val="F9E7C4"/>
+              </a:solidFill>
+              <a:effectLst/>
+              <a:latin typeface="Consolas" panose="020B0609020204030204" pitchFamily="49" charset="0"/>
+            </a:endParaRPr>
+          </a:p>
+          <a:p>
+            <a:r>
+              <a:rPr lang="en-US" sz="1200" b="0">
+                <a:solidFill>
+                  <a:srgbClr val="F9E7C4"/>
+                </a:solidFill>
+                <a:effectLst/>
+                <a:latin typeface="Consolas" panose="020B0609020204030204" pitchFamily="49" charset="0"/>
+              </a:rPr>
+              <a:t>            </a:t>
+            </a:r>
+            <a:r>
+              <a:rPr lang="en-US" sz="1200" b="0">
+                <a:solidFill>
+                  <a:srgbClr val="81755D"/>
+                </a:solidFill>
+                <a:effectLst/>
+                <a:latin typeface="Consolas" panose="020B0609020204030204" pitchFamily="49" charset="0"/>
+              </a:rPr>
+              <a:t>}])</a:t>
+            </a:r>
+            <a:r>
+              <a:rPr lang="en-US" sz="1200" b="0">
+                <a:solidFill>
+                  <a:srgbClr val="B294BB"/>
+                </a:solidFill>
+                <a:effectLst/>
+                <a:latin typeface="Consolas" panose="020B0609020204030204" pitchFamily="49" charset="0"/>
+              </a:rPr>
+              <a:t>-&gt;</a:t>
+            </a:r>
+            <a:r>
+              <a:rPr lang="en-US" sz="1200" b="0">
+                <a:solidFill>
+                  <a:srgbClr val="81A2BE"/>
+                </a:solidFill>
+                <a:effectLst/>
+                <a:latin typeface="Consolas" panose="020B0609020204030204" pitchFamily="49" charset="0"/>
+              </a:rPr>
+              <a:t>where</a:t>
+            </a:r>
+            <a:r>
+              <a:rPr lang="en-US" sz="1200" b="0">
+                <a:solidFill>
+                  <a:srgbClr val="81755D"/>
+                </a:solidFill>
+                <a:effectLst/>
+                <a:latin typeface="Consolas" panose="020B0609020204030204" pitchFamily="49" charset="0"/>
+              </a:rPr>
+              <a:t>('</a:t>
+            </a:r>
+            <a:r>
+              <a:rPr lang="en-US" sz="1200" b="0">
+                <a:solidFill>
+                  <a:srgbClr val="B5BD68"/>
+                </a:solidFill>
+                <a:effectLst/>
+                <a:latin typeface="Consolas" panose="020B0609020204030204" pitchFamily="49" charset="0"/>
+              </a:rPr>
+              <a:t>session_id</a:t>
+            </a:r>
+            <a:r>
+              <a:rPr lang="en-US" sz="1200" b="0">
+                <a:solidFill>
+                  <a:srgbClr val="81755D"/>
+                </a:solidFill>
+                <a:effectLst/>
+                <a:latin typeface="Consolas" panose="020B0609020204030204" pitchFamily="49" charset="0"/>
+              </a:rPr>
+              <a:t>',</a:t>
+            </a:r>
+            <a:r>
+              <a:rPr lang="en-US" sz="1200" b="0">
+                <a:solidFill>
+                  <a:srgbClr val="F9E7C4"/>
+                </a:solidFill>
+                <a:effectLst/>
+                <a:latin typeface="Consolas" panose="020B0609020204030204" pitchFamily="49" charset="0"/>
+              </a:rPr>
+              <a:t> </a:t>
+            </a:r>
+            <a:r>
+              <a:rPr lang="en-US" sz="1200" b="0">
+                <a:solidFill>
+                  <a:srgbClr val="F0C674"/>
+                </a:solidFill>
+                <a:effectLst/>
+                <a:latin typeface="Consolas" panose="020B0609020204030204" pitchFamily="49" charset="0"/>
+              </a:rPr>
+              <a:t>Session</a:t>
+            </a:r>
+            <a:r>
+              <a:rPr lang="en-US" sz="1200" b="0">
+                <a:solidFill>
+                  <a:srgbClr val="B294BB"/>
+                </a:solidFill>
+                <a:effectLst/>
+                <a:latin typeface="Consolas" panose="020B0609020204030204" pitchFamily="49" charset="0"/>
+              </a:rPr>
+              <a:t>::</a:t>
+            </a:r>
+            <a:r>
+              <a:rPr lang="en-US" sz="1200" b="0">
+                <a:solidFill>
+                  <a:srgbClr val="81A2BE"/>
+                </a:solidFill>
+                <a:effectLst/>
+                <a:latin typeface="Consolas" panose="020B0609020204030204" pitchFamily="49" charset="0"/>
+              </a:rPr>
+              <a:t>getId</a:t>
+            </a:r>
+            <a:r>
+              <a:rPr lang="en-US" sz="1200" b="0">
+                <a:solidFill>
+                  <a:srgbClr val="81755D"/>
+                </a:solidFill>
+                <a:effectLst/>
+                <a:latin typeface="Consolas" panose="020B0609020204030204" pitchFamily="49" charset="0"/>
+              </a:rPr>
+              <a:t>())</a:t>
+            </a:r>
+            <a:r>
+              <a:rPr lang="en-US" sz="1200" b="0">
+                <a:solidFill>
+                  <a:srgbClr val="B294BB"/>
+                </a:solidFill>
+                <a:effectLst/>
+                <a:latin typeface="Consolas" panose="020B0609020204030204" pitchFamily="49" charset="0"/>
+              </a:rPr>
+              <a:t>-&gt;</a:t>
+            </a:r>
+            <a:r>
+              <a:rPr lang="en-US" sz="1200" b="0">
+                <a:solidFill>
+                  <a:srgbClr val="81A2BE"/>
+                </a:solidFill>
+                <a:effectLst/>
+                <a:latin typeface="Consolas" panose="020B0609020204030204" pitchFamily="49" charset="0"/>
+              </a:rPr>
+              <a:t>orderByDesc</a:t>
+            </a:r>
+            <a:r>
+              <a:rPr lang="en-US" sz="1200" b="0">
+                <a:solidFill>
+                  <a:srgbClr val="81755D"/>
+                </a:solidFill>
+                <a:effectLst/>
+                <a:latin typeface="Consolas" panose="020B0609020204030204" pitchFamily="49" charset="0"/>
+              </a:rPr>
+              <a:t>('</a:t>
+            </a:r>
+            <a:r>
+              <a:rPr lang="en-US" sz="1200" b="0">
+                <a:solidFill>
+                  <a:srgbClr val="B5BD68"/>
+                </a:solidFill>
+                <a:effectLst/>
+                <a:latin typeface="Consolas" panose="020B0609020204030204" pitchFamily="49" charset="0"/>
+              </a:rPr>
+              <a:t>created_at</a:t>
+            </a:r>
+            <a:r>
+              <a:rPr lang="en-US" sz="1200" b="0">
+                <a:solidFill>
+                  <a:srgbClr val="81755D"/>
+                </a:solidFill>
+                <a:effectLst/>
+                <a:latin typeface="Consolas" panose="020B0609020204030204" pitchFamily="49" charset="0"/>
+              </a:rPr>
+              <a:t>')</a:t>
+            </a:r>
+            <a:r>
+              <a:rPr lang="en-US" sz="1200" b="0">
+                <a:solidFill>
+                  <a:srgbClr val="B294BB"/>
+                </a:solidFill>
+                <a:effectLst/>
+                <a:latin typeface="Consolas" panose="020B0609020204030204" pitchFamily="49" charset="0"/>
+              </a:rPr>
+              <a:t>-&gt;</a:t>
+            </a:r>
+            <a:r>
+              <a:rPr lang="en-US" sz="1200" b="0">
+                <a:solidFill>
+                  <a:srgbClr val="81A2BE"/>
+                </a:solidFill>
+                <a:effectLst/>
+                <a:latin typeface="Consolas" panose="020B0609020204030204" pitchFamily="49" charset="0"/>
+              </a:rPr>
+              <a:t>get</a:t>
+            </a:r>
+            <a:r>
+              <a:rPr lang="en-US" sz="1200" b="0">
+                <a:solidFill>
+                  <a:srgbClr val="81755D"/>
+                </a:solidFill>
+                <a:effectLst/>
+                <a:latin typeface="Consolas" panose="020B0609020204030204" pitchFamily="49" charset="0"/>
+              </a:rPr>
+              <a:t>();</a:t>
+            </a:r>
+            <a:endParaRPr lang="en-US" sz="1200" b="0">
+              <a:solidFill>
+                <a:srgbClr val="F9E7C4"/>
+              </a:solidFill>
+              <a:effectLst/>
+              <a:latin typeface="Consolas" panose="020B0609020204030204" pitchFamily="49" charset="0"/>
+            </a:endParaRPr>
+          </a:p>
+          <a:p>
+            <a:r>
+              <a:rPr lang="en-US" sz="1200" b="0">
+                <a:solidFill>
+                  <a:srgbClr val="F9E7C4"/>
+                </a:solidFill>
+                <a:effectLst/>
+                <a:latin typeface="Consolas" panose="020B0609020204030204" pitchFamily="49" charset="0"/>
+              </a:rPr>
+              <a:t>        </a:t>
+            </a:r>
+            <a:r>
+              <a:rPr lang="en-US" sz="1200" b="0">
+                <a:solidFill>
+                  <a:srgbClr val="81755D"/>
+                </a:solidFill>
+                <a:effectLst/>
+                <a:latin typeface="Consolas" panose="020B0609020204030204" pitchFamily="49" charset="0"/>
+              </a:rPr>
+              <a:t>}</a:t>
+            </a:r>
+            <a:endParaRPr lang="en-US" sz="1200" b="0">
+              <a:solidFill>
+                <a:srgbClr val="F9E7C4"/>
+              </a:solidFill>
+              <a:effectLst/>
+              <a:latin typeface="Consolas" panose="020B0609020204030204" pitchFamily="49" charset="0"/>
+            </a:endParaRPr>
+          </a:p>
+          <a:p>
+            <a:br>
+              <a:rPr lang="en-US" sz="1200" b="0">
+                <a:solidFill>
+                  <a:srgbClr val="F9E7C4"/>
+                </a:solidFill>
+                <a:effectLst/>
+                <a:latin typeface="Consolas" panose="020B0609020204030204" pitchFamily="49" charset="0"/>
+              </a:rPr>
+            </a:br>
+            <a:r>
+              <a:rPr lang="en-US" sz="1200" b="0">
+                <a:solidFill>
+                  <a:srgbClr val="F9E7C4"/>
+                </a:solidFill>
+                <a:effectLst/>
+                <a:latin typeface="Consolas" panose="020B0609020204030204" pitchFamily="49" charset="0"/>
+              </a:rPr>
+              <a:t>        </a:t>
+            </a:r>
+            <a:r>
+              <a:rPr lang="en-US" sz="1200" b="0">
+                <a:solidFill>
+                  <a:srgbClr val="B294BB"/>
+                </a:solidFill>
+                <a:effectLst/>
+                <a:latin typeface="Consolas" panose="020B0609020204030204" pitchFamily="49" charset="0"/>
+              </a:rPr>
+              <a:t>return</a:t>
+            </a:r>
+            <a:r>
+              <a:rPr lang="en-US" sz="1200" b="0">
+                <a:solidFill>
+                  <a:srgbClr val="F9E7C4"/>
+                </a:solidFill>
+                <a:effectLst/>
+                <a:latin typeface="Consolas" panose="020B0609020204030204" pitchFamily="49" charset="0"/>
+              </a:rPr>
+              <a:t> </a:t>
+            </a:r>
+            <a:r>
+              <a:rPr lang="en-US" sz="1200" b="0">
+                <a:solidFill>
+                  <a:srgbClr val="81755D"/>
+                </a:solidFill>
+                <a:effectLst/>
+                <a:latin typeface="Consolas" panose="020B0609020204030204" pitchFamily="49" charset="0"/>
+              </a:rPr>
+              <a:t>$</a:t>
+            </a:r>
+            <a:r>
+              <a:rPr lang="en-US" sz="1200" b="0">
+                <a:solidFill>
+                  <a:srgbClr val="FF0000"/>
+                </a:solidFill>
+                <a:effectLst/>
+                <a:latin typeface="Consolas" panose="020B0609020204030204" pitchFamily="49" charset="0"/>
+              </a:rPr>
+              <a:t>cartProducts</a:t>
+            </a:r>
+            <a:r>
+              <a:rPr lang="en-US" sz="1200" b="0">
+                <a:solidFill>
+                  <a:srgbClr val="81755D"/>
+                </a:solidFill>
+                <a:effectLst/>
+                <a:latin typeface="Consolas" panose="020B0609020204030204" pitchFamily="49" charset="0"/>
+              </a:rPr>
+              <a:t>;</a:t>
+            </a:r>
+            <a:endParaRPr lang="en-US" sz="1200" b="0">
+              <a:solidFill>
+                <a:srgbClr val="F9E7C4"/>
+              </a:solidFill>
+              <a:effectLst/>
+              <a:latin typeface="Consolas" panose="020B0609020204030204" pitchFamily="49" charset="0"/>
+            </a:endParaRPr>
+          </a:p>
+          <a:p>
+            <a:r>
+              <a:rPr lang="en-US" sz="1200" b="0">
+                <a:solidFill>
+                  <a:srgbClr val="F9E7C4"/>
+                </a:solidFill>
+                <a:effectLst/>
+                <a:latin typeface="Consolas" panose="020B0609020204030204" pitchFamily="49" charset="0"/>
+              </a:rPr>
+              <a:t>    </a:t>
+            </a:r>
+            <a:r>
+              <a:rPr lang="en-US" sz="1200" b="0">
+                <a:solidFill>
+                  <a:srgbClr val="81755D"/>
+                </a:solidFill>
+                <a:effectLst/>
+                <a:latin typeface="Consolas" panose="020B0609020204030204" pitchFamily="49" charset="0"/>
+              </a:rPr>
+              <a:t>}</a:t>
+            </a:r>
+            <a:endParaRPr lang="en-US" sz="1200" b="0">
+              <a:solidFill>
+                <a:srgbClr val="F9E7C4"/>
+              </a:solidFill>
+              <a:effectLst/>
+              <a:latin typeface="Consolas" panose="020B0609020204030204" pitchFamily="49" charset="0"/>
+            </a:endParaRPr>
+          </a:p>
+        </p:txBody>
+      </p:sp>
+    </p:spTree>
+    <p:extLst>
+      <p:ext uri="{BB962C8B-B14F-4D97-AF65-F5344CB8AC3E}">
+        <p14:creationId xmlns:p14="http://schemas.microsoft.com/office/powerpoint/2010/main" val="3399659449"/>
+      </p:ext>
+    </p:extLst>
+  </p:cSld>
+  <p:clrMapOvr>
+    <a:masterClrMapping/>
+  </p:clrMapOvr>
+  <mc:AlternateContent xmlns:mc="http://schemas.openxmlformats.org/markup-compatibility/2006">
+    <mc:Choice xmlns:p14="http://schemas.microsoft.com/office/powerpoint/2010/main" Requires="p14">
+      <p:transition spd="slow" p14:dur="2000" advTm="2461"/>
+    </mc:Choice>
+    <mc:Fallback>
+      <p:transition spd="slow" advTm="2461"/>
+    </mc:Fallback>
+  </mc:AlternateContent>
+</p:sld>
+</file>
+
 <file path=ppt/slides/slide3.xml><?xml version="1.0" encoding="utf-8"?>
 <p:sld xmlns:a="http://schemas.openxmlformats.org/drawingml/2006/main" xmlns:r="http://schemas.openxmlformats.org/officeDocument/2006/relationships" xmlns:p="http://schemas.openxmlformats.org/presentationml/2006/main">
   <p:cSld>

</xml_diff>

<commit_message>
Comenzi - plasarea comenzilor
Plasarea comenzilor de cater utilizator si stergerea cosului cu produse dupa plasarea comenzii
</commit_message>
<xml_diff>
--- a/_presentation/prezentare_aplicatie.pptx
+++ b/_presentation/prezentare_aplicatie.pptx
@@ -285,7 +285,7 @@
             <a:fld id="{87DE6118-2437-4B30-8E3C-4D2BE6020583}" type="datetimeFigureOut">
               <a:rPr lang="en-US" smtClean="0"/>
               <a:pPr/>
-              <a:t>4/13/2022</a:t>
+              <a:t>4/30/2022</a:t>
             </a:fld>
             <a:endParaRPr lang="en-US"/>
           </a:p>
@@ -486,7 +486,7 @@
           <a:p>
             <a:fld id="{87DE6118-2437-4B30-8E3C-4D2BE6020583}" type="datetimeFigureOut">
               <a:rPr lang="en-US" smtClean="0"/>
-              <a:t>4/13/2022</a:t>
+              <a:t>4/30/2022</a:t>
             </a:fld>
             <a:endParaRPr lang="en-US"/>
           </a:p>
@@ -696,7 +696,7 @@
           <a:p>
             <a:fld id="{87DE6118-2437-4B30-8E3C-4D2BE6020583}" type="datetimeFigureOut">
               <a:rPr lang="en-US" smtClean="0"/>
-              <a:t>4/13/2022</a:t>
+              <a:t>4/30/2022</a:t>
             </a:fld>
             <a:endParaRPr lang="en-US"/>
           </a:p>
@@ -909,7 +909,7 @@
             <a:fld id="{87DE6118-2437-4B30-8E3C-4D2BE6020583}" type="datetimeFigureOut">
               <a:rPr lang="en-US" smtClean="0"/>
               <a:pPr/>
-              <a:t>4/13/2022</a:t>
+              <a:t>4/30/2022</a:t>
             </a:fld>
             <a:endParaRPr lang="en-US"/>
           </a:p>
@@ -1121,7 +1121,7 @@
           <a:p>
             <a:fld id="{87DE6118-2437-4B30-8E3C-4D2BE6020583}" type="datetimeFigureOut">
               <a:rPr lang="en-US" smtClean="0"/>
-              <a:t>4/13/2022</a:t>
+              <a:t>4/30/2022</a:t>
             </a:fld>
             <a:endParaRPr lang="en-US"/>
           </a:p>
@@ -1401,7 +1401,7 @@
             <a:fld id="{87DE6118-2437-4B30-8E3C-4D2BE6020583}" type="datetimeFigureOut">
               <a:rPr lang="en-US" smtClean="0"/>
               <a:pPr/>
-              <a:t>4/13/2022</a:t>
+              <a:t>4/30/2022</a:t>
             </a:fld>
             <a:endParaRPr lang="en-US"/>
           </a:p>
@@ -1670,7 +1670,7 @@
           <a:p>
             <a:fld id="{87DE6118-2437-4B30-8E3C-4D2BE6020583}" type="datetimeFigureOut">
               <a:rPr lang="en-US" smtClean="0"/>
-              <a:t>4/13/2022</a:t>
+              <a:t>4/30/2022</a:t>
             </a:fld>
             <a:endParaRPr lang="en-US"/>
           </a:p>
@@ -2086,7 +2086,7 @@
           <a:p>
             <a:fld id="{87DE6118-2437-4B30-8E3C-4D2BE6020583}" type="datetimeFigureOut">
               <a:rPr lang="en-US" smtClean="0"/>
-              <a:t>4/13/2022</a:t>
+              <a:t>4/30/2022</a:t>
             </a:fld>
             <a:endParaRPr lang="en-US"/>
           </a:p>
@@ -2235,7 +2235,7 @@
           <a:p>
             <a:fld id="{87DE6118-2437-4B30-8E3C-4D2BE6020583}" type="datetimeFigureOut">
               <a:rPr lang="en-US" smtClean="0"/>
-              <a:t>4/13/2022</a:t>
+              <a:t>4/30/2022</a:t>
             </a:fld>
             <a:endParaRPr lang="en-US"/>
           </a:p>
@@ -2361,7 +2361,7 @@
           <a:p>
             <a:fld id="{87DE6118-2437-4B30-8E3C-4D2BE6020583}" type="datetimeFigureOut">
               <a:rPr lang="en-US" smtClean="0"/>
-              <a:t>4/13/2022</a:t>
+              <a:t>4/30/2022</a:t>
             </a:fld>
             <a:endParaRPr lang="en-US"/>
           </a:p>
@@ -2613,7 +2613,7 @@
             <a:fld id="{87DE6118-2437-4B30-8E3C-4D2BE6020583}" type="datetimeFigureOut">
               <a:rPr lang="en-US" smtClean="0"/>
               <a:pPr/>
-              <a:t>4/13/2022</a:t>
+              <a:t>4/30/2022</a:t>
             </a:fld>
             <a:endParaRPr lang="en-US"/>
           </a:p>
@@ -2833,7 +2833,7 @@
           <a:p>
             <a:fld id="{87DE6118-2437-4B30-8E3C-4D2BE6020583}" type="datetimeFigureOut">
               <a:rPr lang="en-US" smtClean="0"/>
-              <a:t>4/13/2022</a:t>
+              <a:t>4/30/2022</a:t>
             </a:fld>
             <a:endParaRPr lang="en-US"/>
           </a:p>
@@ -3259,7 +3259,7 @@
             <a:fld id="{87DE6118-2437-4B30-8E3C-4D2BE6020583}" type="datetimeFigureOut">
               <a:rPr lang="en-US" smtClean="0"/>
               <a:pPr/>
-              <a:t>4/13/2022</a:t>
+              <a:t>4/30/2022</a:t>
             </a:fld>
             <a:endParaRPr lang="en-US"/>
           </a:p>
@@ -3466,7 +3466,7 @@
           <a:p>
             <a:fld id="{87DE6118-2437-4B30-8E3C-4D2BE6020583}" type="datetimeFigureOut">
               <a:rPr lang="en-US" smtClean="0"/>
-              <a:t>4/13/2022</a:t>
+              <a:t>4/30/2022</a:t>
             </a:fld>
             <a:endParaRPr lang="en-US"/>
           </a:p>
@@ -3681,7 +3681,7 @@
           <a:p>
             <a:fld id="{87DE6118-2437-4B30-8E3C-4D2BE6020583}" type="datetimeFigureOut">
               <a:rPr lang="en-US" smtClean="0"/>
-              <a:t>4/13/2022</a:t>
+              <a:t>4/30/2022</a:t>
             </a:fld>
             <a:endParaRPr lang="en-US"/>
           </a:p>
@@ -3923,7 +3923,7 @@
             <a:fld id="{87DE6118-2437-4B30-8E3C-4D2BE6020583}" type="datetimeFigureOut">
               <a:rPr lang="en-US" smtClean="0"/>
               <a:pPr/>
-              <a:t>4/13/2022</a:t>
+              <a:t>4/30/2022</a:t>
             </a:fld>
             <a:endParaRPr lang="en-US"/>
           </a:p>
@@ -4124,7 +4124,7 @@
           <a:p>
             <a:fld id="{87DE6118-2437-4B30-8E3C-4D2BE6020583}" type="datetimeFigureOut">
               <a:rPr lang="en-US" smtClean="0"/>
-              <a:t>4/13/2022</a:t>
+              <a:t>4/30/2022</a:t>
             </a:fld>
             <a:endParaRPr lang="en-US"/>
           </a:p>
@@ -4401,7 +4401,7 @@
             <a:fld id="{87DE6118-2437-4B30-8E3C-4D2BE6020583}" type="datetimeFigureOut">
               <a:rPr lang="en-US" smtClean="0"/>
               <a:pPr/>
-              <a:t>4/13/2022</a:t>
+              <a:t>4/30/2022</a:t>
             </a:fld>
             <a:endParaRPr lang="en-US"/>
           </a:p>
@@ -4670,7 +4670,7 @@
           <a:p>
             <a:fld id="{87DE6118-2437-4B30-8E3C-4D2BE6020583}" type="datetimeFigureOut">
               <a:rPr lang="en-US" smtClean="0"/>
-              <a:t>4/13/2022</a:t>
+              <a:t>4/30/2022</a:t>
             </a:fld>
             <a:endParaRPr lang="en-US"/>
           </a:p>
@@ -5085,7 +5085,7 @@
           <a:p>
             <a:fld id="{87DE6118-2437-4B30-8E3C-4D2BE6020583}" type="datetimeFigureOut">
               <a:rPr lang="en-US" smtClean="0"/>
-              <a:t>4/13/2022</a:t>
+              <a:t>4/30/2022</a:t>
             </a:fld>
             <a:endParaRPr lang="en-US"/>
           </a:p>
@@ -5227,7 +5227,7 @@
           <a:p>
             <a:fld id="{87DE6118-2437-4B30-8E3C-4D2BE6020583}" type="datetimeFigureOut">
               <a:rPr lang="en-US" smtClean="0"/>
-              <a:t>4/13/2022</a:t>
+              <a:t>4/30/2022</a:t>
             </a:fld>
             <a:endParaRPr lang="en-US"/>
           </a:p>
@@ -5340,7 +5340,7 @@
           <a:p>
             <a:fld id="{87DE6118-2437-4B30-8E3C-4D2BE6020583}" type="datetimeFigureOut">
               <a:rPr lang="en-US" smtClean="0"/>
-              <a:t>4/13/2022</a:t>
+              <a:t>4/30/2022</a:t>
             </a:fld>
             <a:endParaRPr lang="en-US"/>
           </a:p>
@@ -5617,7 +5617,7 @@
             <a:fld id="{87DE6118-2437-4B30-8E3C-4D2BE6020583}" type="datetimeFigureOut">
               <a:rPr lang="en-US" smtClean="0"/>
               <a:pPr/>
-              <a:t>4/13/2022</a:t>
+              <a:t>4/30/2022</a:t>
             </a:fld>
             <a:endParaRPr lang="en-US"/>
           </a:p>
@@ -5932,7 +5932,7 @@
             <a:fld id="{87DE6118-2437-4B30-8E3C-4D2BE6020583}" type="datetimeFigureOut">
               <a:rPr lang="en-US" smtClean="0"/>
               <a:pPr/>
-              <a:t>4/13/2022</a:t>
+              <a:t>4/30/2022</a:t>
             </a:fld>
             <a:endParaRPr lang="en-US"/>
           </a:p>
@@ -6223,7 +6223,7 @@
             <a:fld id="{87DE6118-2437-4B30-8E3C-4D2BE6020583}" type="datetimeFigureOut">
               <a:rPr lang="en-US" smtClean="0"/>
               <a:pPr/>
-              <a:t>4/13/2022</a:t>
+              <a:t>4/30/2022</a:t>
             </a:fld>
             <a:endParaRPr lang="en-US"/>
           </a:p>
@@ -6424,7 +6424,7 @@
           <a:p>
             <a:fld id="{87DE6118-2437-4B30-8E3C-4D2BE6020583}" type="datetimeFigureOut">
               <a:rPr lang="en-US" smtClean="0"/>
-              <a:t>4/13/2022</a:t>
+              <a:t>4/30/2022</a:t>
             </a:fld>
             <a:endParaRPr lang="en-US"/>
           </a:p>
@@ -6634,7 +6634,7 @@
           <a:p>
             <a:fld id="{87DE6118-2437-4B30-8E3C-4D2BE6020583}" type="datetimeFigureOut">
               <a:rPr lang="en-US" smtClean="0"/>
-              <a:t>4/13/2022</a:t>
+              <a:t>4/30/2022</a:t>
             </a:fld>
             <a:endParaRPr lang="en-US"/>
           </a:p>
@@ -6902,7 +6902,7 @@
           <a:p>
             <a:fld id="{87DE6118-2437-4B30-8E3C-4D2BE6020583}" type="datetimeFigureOut">
               <a:rPr lang="en-US" smtClean="0"/>
-              <a:t>4/13/2022</a:t>
+              <a:t>4/30/2022</a:t>
             </a:fld>
             <a:endParaRPr lang="en-US"/>
           </a:p>
@@ -7317,7 +7317,7 @@
           <a:p>
             <a:fld id="{87DE6118-2437-4B30-8E3C-4D2BE6020583}" type="datetimeFigureOut">
               <a:rPr lang="en-US" smtClean="0"/>
-              <a:t>4/13/2022</a:t>
+              <a:t>4/30/2022</a:t>
             </a:fld>
             <a:endParaRPr lang="en-US"/>
           </a:p>
@@ -7459,7 +7459,7 @@
           <a:p>
             <a:fld id="{87DE6118-2437-4B30-8E3C-4D2BE6020583}" type="datetimeFigureOut">
               <a:rPr lang="en-US" smtClean="0"/>
-              <a:t>4/13/2022</a:t>
+              <a:t>4/30/2022</a:t>
             </a:fld>
             <a:endParaRPr lang="en-US"/>
           </a:p>
@@ -7572,7 +7572,7 @@
           <a:p>
             <a:fld id="{87DE6118-2437-4B30-8E3C-4D2BE6020583}" type="datetimeFigureOut">
               <a:rPr lang="en-US" smtClean="0"/>
-              <a:t>4/13/2022</a:t>
+              <a:t>4/30/2022</a:t>
             </a:fld>
             <a:endParaRPr lang="en-US"/>
           </a:p>
@@ -7886,7 +7886,7 @@
             <a:fld id="{87DE6118-2437-4B30-8E3C-4D2BE6020583}" type="datetimeFigureOut">
               <a:rPr lang="en-US" smtClean="0"/>
               <a:pPr/>
-              <a:t>4/13/2022</a:t>
+              <a:t>4/30/2022</a:t>
             </a:fld>
             <a:endParaRPr lang="en-US"/>
           </a:p>
@@ -8177,7 +8177,7 @@
             <a:fld id="{87DE6118-2437-4B30-8E3C-4D2BE6020583}" type="datetimeFigureOut">
               <a:rPr lang="en-US" smtClean="0"/>
               <a:pPr/>
-              <a:t>4/13/2022</a:t>
+              <a:t>4/30/2022</a:t>
             </a:fld>
             <a:endParaRPr lang="en-US"/>
           </a:p>
@@ -8422,7 +8422,7 @@
             <a:fld id="{87DE6118-2437-4B30-8E3C-4D2BE6020583}" type="datetimeFigureOut">
               <a:rPr lang="en-US" smtClean="0"/>
               <a:pPr/>
-              <a:t>4/13/2022</a:t>
+              <a:t>4/30/2022</a:t>
             </a:fld>
             <a:endParaRPr lang="en-US"/>
           </a:p>
@@ -9059,7 +9059,7 @@
             <a:fld id="{87DE6118-2437-4B30-8E3C-4D2BE6020583}" type="datetimeFigureOut">
               <a:rPr lang="en-US" smtClean="0"/>
               <a:pPr/>
-              <a:t>4/13/2022</a:t>
+              <a:t>4/30/2022</a:t>
             </a:fld>
             <a:endParaRPr lang="en-US"/>
           </a:p>
@@ -9705,7 +9705,7 @@
             <a:fld id="{87DE6118-2437-4B30-8E3C-4D2BE6020583}" type="datetimeFigureOut">
               <a:rPr lang="en-US" smtClean="0"/>
               <a:pPr/>
-              <a:t>4/13/2022</a:t>
+              <a:t>4/30/2022</a:t>
             </a:fld>
             <a:endParaRPr lang="en-US"/>
           </a:p>
@@ -25867,14 +25867,14 @@
           <p:nvPr>
             <p:extLst>
               <p:ext uri="{D42A27DB-BD31-4B8C-83A1-F6EECF244321}">
-                <p14:modId xmlns:p14="http://schemas.microsoft.com/office/powerpoint/2010/main" val="3711624908"/>
+                <p14:modId xmlns:p14="http://schemas.microsoft.com/office/powerpoint/2010/main" val="2957433688"/>
               </p:ext>
             </p:extLst>
           </p:nvPr>
         </p:nvGraphicFramePr>
         <p:xfrm>
-          <a:off x="6477885" y="3469545"/>
-          <a:ext cx="1749168" cy="3009744"/>
+          <a:off x="6463855" y="1518861"/>
+          <a:ext cx="1749168" cy="5004240"/>
         </p:xfrm>
         <a:graphic>
           <a:graphicData uri="http://schemas.openxmlformats.org/drawingml/2006/table">
@@ -25891,7 +25891,7 @@
                   </a:extLst>
                 </a:gridCol>
               </a:tblGrid>
-              <a:tr h="334416">
+              <a:tr h="417020">
                 <a:tc>
                   <a:txBody>
                     <a:bodyPr/>
@@ -25919,7 +25919,7 @@
                   </a:ext>
                 </a:extLst>
               </a:tr>
-              <a:tr h="334416">
+              <a:tr h="417020">
                 <a:tc>
                   <a:txBody>
                     <a:bodyPr/>
@@ -25940,7 +25940,7 @@
                   </a:ext>
                 </a:extLst>
               </a:tr>
-              <a:tr h="334416">
+              <a:tr h="417020">
                 <a:tc>
                   <a:txBody>
                     <a:bodyPr/>
@@ -25961,7 +25961,7 @@
                   </a:ext>
                 </a:extLst>
               </a:tr>
-              <a:tr h="334416">
+              <a:tr h="417020">
                 <a:tc>
                   <a:txBody>
                     <a:bodyPr/>
@@ -25969,7 +25969,7 @@
                     <a:p>
                       <a:r>
                         <a:rPr lang="en-US" sz="1400"/>
-                        <a:t>address_id</a:t>
+                        <a:t>name</a:t>
                       </a:r>
                       <a:endParaRPr lang="ro-RO" sz="1400"/>
                     </a:p>
@@ -25982,7 +25982,70 @@
                   </a:ext>
                 </a:extLst>
               </a:tr>
-              <a:tr h="334416">
+              <a:tr h="417020">
+                <a:tc>
+                  <a:txBody>
+                    <a:bodyPr/>
+                    <a:lstStyle/>
+                    <a:p>
+                      <a:r>
+                        <a:rPr lang="en-US" sz="1400"/>
+                        <a:t>city</a:t>
+                      </a:r>
+                      <a:endParaRPr lang="ro-RO" sz="1400"/>
+                    </a:p>
+                  </a:txBody>
+                  <a:tcPr/>
+                </a:tc>
+                <a:extLst>
+                  <a:ext uri="{0D108BD9-81ED-4DB2-BD59-A6C34878D82A}">
+                    <a16:rowId xmlns:a16="http://schemas.microsoft.com/office/drawing/2014/main" val="2360574593"/>
+                  </a:ext>
+                </a:extLst>
+              </a:tr>
+              <a:tr h="417020">
+                <a:tc>
+                  <a:txBody>
+                    <a:bodyPr/>
+                    <a:lstStyle/>
+                    <a:p>
+                      <a:r>
+                        <a:rPr lang="en-US" sz="1400"/>
+                        <a:t>address</a:t>
+                      </a:r>
+                      <a:endParaRPr lang="ro-RO" sz="1400"/>
+                    </a:p>
+                  </a:txBody>
+                  <a:tcPr/>
+                </a:tc>
+                <a:extLst>
+                  <a:ext uri="{0D108BD9-81ED-4DB2-BD59-A6C34878D82A}">
+                    <a16:rowId xmlns:a16="http://schemas.microsoft.com/office/drawing/2014/main" val="1935278112"/>
+                  </a:ext>
+                </a:extLst>
+              </a:tr>
+              <a:tr h="417020">
+                <a:tc>
+                  <a:txBody>
+                    <a:bodyPr/>
+                    <a:lstStyle/>
+                    <a:p>
+                      <a:r>
+                        <a:rPr lang="en-US" sz="1400"/>
+                        <a:t>phone</a:t>
+                      </a:r>
+                      <a:endParaRPr lang="ro-RO" sz="1400"/>
+                    </a:p>
+                  </a:txBody>
+                  <a:tcPr/>
+                </a:tc>
+                <a:extLst>
+                  <a:ext uri="{0D108BD9-81ED-4DB2-BD59-A6C34878D82A}">
+                    <a16:rowId xmlns:a16="http://schemas.microsoft.com/office/drawing/2014/main" val="1685896848"/>
+                  </a:ext>
+                </a:extLst>
+              </a:tr>
+              <a:tr h="417020">
                 <a:tc>
                   <a:txBody>
                     <a:bodyPr/>
@@ -26010,7 +26073,7 @@
                   </a:ext>
                 </a:extLst>
               </a:tr>
-              <a:tr h="334416">
+              <a:tr h="417020">
                 <a:tc>
                   <a:txBody>
                     <a:bodyPr/>
@@ -26038,7 +26101,7 @@
                   </a:ext>
                 </a:extLst>
               </a:tr>
-              <a:tr h="334416">
+              <a:tr h="417020">
                 <a:tc>
                   <a:txBody>
                     <a:bodyPr/>
@@ -26066,7 +26129,7 @@
                   </a:ext>
                 </a:extLst>
               </a:tr>
-              <a:tr h="334416">
+              <a:tr h="417020">
                 <a:tc>
                   <a:txBody>
                     <a:bodyPr/>
@@ -26094,7 +26157,7 @@
                   </a:ext>
                 </a:extLst>
               </a:tr>
-              <a:tr h="334416">
+              <a:tr h="417020">
                 <a:tc>
                   <a:txBody>
                     <a:bodyPr/>
@@ -26829,50 +26892,6 @@
           </a:prstGeom>
           <a:ln>
             <a:tailEnd type="triangle"/>
-          </a:ln>
-        </p:spPr>
-        <p:style>
-          <a:lnRef idx="1">
-            <a:schemeClr val="accent1"/>
-          </a:lnRef>
-          <a:fillRef idx="0">
-            <a:schemeClr val="accent1"/>
-          </a:fillRef>
-          <a:effectRef idx="0">
-            <a:schemeClr val="accent1"/>
-          </a:effectRef>
-          <a:fontRef idx="minor">
-            <a:schemeClr val="tx1"/>
-          </a:fontRef>
-        </p:style>
-      </p:cxnSp>
-      <p:cxnSp>
-        <p:nvCxnSpPr>
-          <p:cNvPr id="14" name="Connector: Elbow 13">
-            <a:extLst>
-              <a:ext uri="{FF2B5EF4-FFF2-40B4-BE49-F238E27FC236}">
-                <a16:creationId xmlns:a16="http://schemas.microsoft.com/office/drawing/2014/main" id="{9D46ACAE-F731-46A5-BFAE-34F2FDC1AEF9}"/>
-              </a:ext>
-            </a:extLst>
-          </p:cNvPr>
-          <p:cNvCxnSpPr>
-            <a:cxnSpLocks/>
-          </p:cNvCxnSpPr>
-          <p:nvPr/>
-        </p:nvCxnSpPr>
-        <p:spPr>
-          <a:xfrm rot="16200000" flipH="1">
-            <a:off x="4394170" y="1643932"/>
-            <a:ext cx="3035965" cy="2880631"/>
-          </a:xfrm>
-          <a:prstGeom prst="bentConnector3">
-            <a:avLst>
-              <a:gd name="adj1" fmla="val 50000"/>
-            </a:avLst>
-          </a:prstGeom>
-          <a:ln>
-            <a:headEnd type="triangle" w="med" len="med"/>
-            <a:tailEnd type="none" w="med" len="med"/>
           </a:ln>
         </p:spPr>
         <p:style>

</xml_diff>

<commit_message>
manage orders by users
create pdf for orders
</commit_message>
<xml_diff>
--- a/_presentation/prezentare_aplicatie.pptx
+++ b/_presentation/prezentare_aplicatie.pptx
@@ -30,6 +30,7 @@
     <p:sldId id="276" r:id="rId24"/>
     <p:sldId id="277" r:id="rId25"/>
     <p:sldId id="278" r:id="rId26"/>
+    <p:sldId id="279" r:id="rId27"/>
   </p:sldIdLst>
   <p:sldSz cx="12192000" cy="6858000"/>
   <p:notesSz cx="6858000" cy="9144000"/>
@@ -286,7 +287,7 @@
             <a:fld id="{87DE6118-2437-4B30-8E3C-4D2BE6020583}" type="datetimeFigureOut">
               <a:rPr lang="en-US" smtClean="0"/>
               <a:pPr/>
-              <a:t>5/12/2022</a:t>
+              <a:t>5/14/2022</a:t>
             </a:fld>
             <a:endParaRPr lang="en-US"/>
           </a:p>
@@ -487,7 +488,7 @@
           <a:p>
             <a:fld id="{87DE6118-2437-4B30-8E3C-4D2BE6020583}" type="datetimeFigureOut">
               <a:rPr lang="en-US" smtClean="0"/>
-              <a:t>5/12/2022</a:t>
+              <a:t>5/14/2022</a:t>
             </a:fld>
             <a:endParaRPr lang="en-US"/>
           </a:p>
@@ -697,7 +698,7 @@
           <a:p>
             <a:fld id="{87DE6118-2437-4B30-8E3C-4D2BE6020583}" type="datetimeFigureOut">
               <a:rPr lang="en-US" smtClean="0"/>
-              <a:t>5/12/2022</a:t>
+              <a:t>5/14/2022</a:t>
             </a:fld>
             <a:endParaRPr lang="en-US"/>
           </a:p>
@@ -910,7 +911,7 @@
             <a:fld id="{87DE6118-2437-4B30-8E3C-4D2BE6020583}" type="datetimeFigureOut">
               <a:rPr lang="en-US" smtClean="0"/>
               <a:pPr/>
-              <a:t>5/12/2022</a:t>
+              <a:t>5/14/2022</a:t>
             </a:fld>
             <a:endParaRPr lang="en-US"/>
           </a:p>
@@ -1122,7 +1123,7 @@
           <a:p>
             <a:fld id="{87DE6118-2437-4B30-8E3C-4D2BE6020583}" type="datetimeFigureOut">
               <a:rPr lang="en-US" smtClean="0"/>
-              <a:t>5/12/2022</a:t>
+              <a:t>5/14/2022</a:t>
             </a:fld>
             <a:endParaRPr lang="en-US"/>
           </a:p>
@@ -1402,7 +1403,7 @@
             <a:fld id="{87DE6118-2437-4B30-8E3C-4D2BE6020583}" type="datetimeFigureOut">
               <a:rPr lang="en-US" smtClean="0"/>
               <a:pPr/>
-              <a:t>5/12/2022</a:t>
+              <a:t>5/14/2022</a:t>
             </a:fld>
             <a:endParaRPr lang="en-US"/>
           </a:p>
@@ -1671,7 +1672,7 @@
           <a:p>
             <a:fld id="{87DE6118-2437-4B30-8E3C-4D2BE6020583}" type="datetimeFigureOut">
               <a:rPr lang="en-US" smtClean="0"/>
-              <a:t>5/12/2022</a:t>
+              <a:t>5/14/2022</a:t>
             </a:fld>
             <a:endParaRPr lang="en-US"/>
           </a:p>
@@ -2087,7 +2088,7 @@
           <a:p>
             <a:fld id="{87DE6118-2437-4B30-8E3C-4D2BE6020583}" type="datetimeFigureOut">
               <a:rPr lang="en-US" smtClean="0"/>
-              <a:t>5/12/2022</a:t>
+              <a:t>5/14/2022</a:t>
             </a:fld>
             <a:endParaRPr lang="en-US"/>
           </a:p>
@@ -2236,7 +2237,7 @@
           <a:p>
             <a:fld id="{87DE6118-2437-4B30-8E3C-4D2BE6020583}" type="datetimeFigureOut">
               <a:rPr lang="en-US" smtClean="0"/>
-              <a:t>5/12/2022</a:t>
+              <a:t>5/14/2022</a:t>
             </a:fld>
             <a:endParaRPr lang="en-US"/>
           </a:p>
@@ -2362,7 +2363,7 @@
           <a:p>
             <a:fld id="{87DE6118-2437-4B30-8E3C-4D2BE6020583}" type="datetimeFigureOut">
               <a:rPr lang="en-US" smtClean="0"/>
-              <a:t>5/12/2022</a:t>
+              <a:t>5/14/2022</a:t>
             </a:fld>
             <a:endParaRPr lang="en-US"/>
           </a:p>
@@ -2614,7 +2615,7 @@
             <a:fld id="{87DE6118-2437-4B30-8E3C-4D2BE6020583}" type="datetimeFigureOut">
               <a:rPr lang="en-US" smtClean="0"/>
               <a:pPr/>
-              <a:t>5/12/2022</a:t>
+              <a:t>5/14/2022</a:t>
             </a:fld>
             <a:endParaRPr lang="en-US"/>
           </a:p>
@@ -2834,7 +2835,7 @@
           <a:p>
             <a:fld id="{87DE6118-2437-4B30-8E3C-4D2BE6020583}" type="datetimeFigureOut">
               <a:rPr lang="en-US" smtClean="0"/>
-              <a:t>5/12/2022</a:t>
+              <a:t>5/14/2022</a:t>
             </a:fld>
             <a:endParaRPr lang="en-US"/>
           </a:p>
@@ -3260,7 +3261,7 @@
             <a:fld id="{87DE6118-2437-4B30-8E3C-4D2BE6020583}" type="datetimeFigureOut">
               <a:rPr lang="en-US" smtClean="0"/>
               <a:pPr/>
-              <a:t>5/12/2022</a:t>
+              <a:t>5/14/2022</a:t>
             </a:fld>
             <a:endParaRPr lang="en-US"/>
           </a:p>
@@ -3467,7 +3468,7 @@
           <a:p>
             <a:fld id="{87DE6118-2437-4B30-8E3C-4D2BE6020583}" type="datetimeFigureOut">
               <a:rPr lang="en-US" smtClean="0"/>
-              <a:t>5/12/2022</a:t>
+              <a:t>5/14/2022</a:t>
             </a:fld>
             <a:endParaRPr lang="en-US"/>
           </a:p>
@@ -3682,7 +3683,7 @@
           <a:p>
             <a:fld id="{87DE6118-2437-4B30-8E3C-4D2BE6020583}" type="datetimeFigureOut">
               <a:rPr lang="en-US" smtClean="0"/>
-              <a:t>5/12/2022</a:t>
+              <a:t>5/14/2022</a:t>
             </a:fld>
             <a:endParaRPr lang="en-US"/>
           </a:p>
@@ -3924,7 +3925,7 @@
             <a:fld id="{87DE6118-2437-4B30-8E3C-4D2BE6020583}" type="datetimeFigureOut">
               <a:rPr lang="en-US" smtClean="0"/>
               <a:pPr/>
-              <a:t>5/12/2022</a:t>
+              <a:t>5/14/2022</a:t>
             </a:fld>
             <a:endParaRPr lang="en-US"/>
           </a:p>
@@ -4125,7 +4126,7 @@
           <a:p>
             <a:fld id="{87DE6118-2437-4B30-8E3C-4D2BE6020583}" type="datetimeFigureOut">
               <a:rPr lang="en-US" smtClean="0"/>
-              <a:t>5/12/2022</a:t>
+              <a:t>5/14/2022</a:t>
             </a:fld>
             <a:endParaRPr lang="en-US"/>
           </a:p>
@@ -4402,7 +4403,7 @@
             <a:fld id="{87DE6118-2437-4B30-8E3C-4D2BE6020583}" type="datetimeFigureOut">
               <a:rPr lang="en-US" smtClean="0"/>
               <a:pPr/>
-              <a:t>5/12/2022</a:t>
+              <a:t>5/14/2022</a:t>
             </a:fld>
             <a:endParaRPr lang="en-US"/>
           </a:p>
@@ -4671,7 +4672,7 @@
           <a:p>
             <a:fld id="{87DE6118-2437-4B30-8E3C-4D2BE6020583}" type="datetimeFigureOut">
               <a:rPr lang="en-US" smtClean="0"/>
-              <a:t>5/12/2022</a:t>
+              <a:t>5/14/2022</a:t>
             </a:fld>
             <a:endParaRPr lang="en-US"/>
           </a:p>
@@ -5086,7 +5087,7 @@
           <a:p>
             <a:fld id="{87DE6118-2437-4B30-8E3C-4D2BE6020583}" type="datetimeFigureOut">
               <a:rPr lang="en-US" smtClean="0"/>
-              <a:t>5/12/2022</a:t>
+              <a:t>5/14/2022</a:t>
             </a:fld>
             <a:endParaRPr lang="en-US"/>
           </a:p>
@@ -5228,7 +5229,7 @@
           <a:p>
             <a:fld id="{87DE6118-2437-4B30-8E3C-4D2BE6020583}" type="datetimeFigureOut">
               <a:rPr lang="en-US" smtClean="0"/>
-              <a:t>5/12/2022</a:t>
+              <a:t>5/14/2022</a:t>
             </a:fld>
             <a:endParaRPr lang="en-US"/>
           </a:p>
@@ -5341,7 +5342,7 @@
           <a:p>
             <a:fld id="{87DE6118-2437-4B30-8E3C-4D2BE6020583}" type="datetimeFigureOut">
               <a:rPr lang="en-US" smtClean="0"/>
-              <a:t>5/12/2022</a:t>
+              <a:t>5/14/2022</a:t>
             </a:fld>
             <a:endParaRPr lang="en-US"/>
           </a:p>
@@ -5618,7 +5619,7 @@
             <a:fld id="{87DE6118-2437-4B30-8E3C-4D2BE6020583}" type="datetimeFigureOut">
               <a:rPr lang="en-US" smtClean="0"/>
               <a:pPr/>
-              <a:t>5/12/2022</a:t>
+              <a:t>5/14/2022</a:t>
             </a:fld>
             <a:endParaRPr lang="en-US"/>
           </a:p>
@@ -5933,7 +5934,7 @@
             <a:fld id="{87DE6118-2437-4B30-8E3C-4D2BE6020583}" type="datetimeFigureOut">
               <a:rPr lang="en-US" smtClean="0"/>
               <a:pPr/>
-              <a:t>5/12/2022</a:t>
+              <a:t>5/14/2022</a:t>
             </a:fld>
             <a:endParaRPr lang="en-US"/>
           </a:p>
@@ -6224,7 +6225,7 @@
             <a:fld id="{87DE6118-2437-4B30-8E3C-4D2BE6020583}" type="datetimeFigureOut">
               <a:rPr lang="en-US" smtClean="0"/>
               <a:pPr/>
-              <a:t>5/12/2022</a:t>
+              <a:t>5/14/2022</a:t>
             </a:fld>
             <a:endParaRPr lang="en-US"/>
           </a:p>
@@ -6425,7 +6426,7 @@
           <a:p>
             <a:fld id="{87DE6118-2437-4B30-8E3C-4D2BE6020583}" type="datetimeFigureOut">
               <a:rPr lang="en-US" smtClean="0"/>
-              <a:t>5/12/2022</a:t>
+              <a:t>5/14/2022</a:t>
             </a:fld>
             <a:endParaRPr lang="en-US"/>
           </a:p>
@@ -6635,7 +6636,7 @@
           <a:p>
             <a:fld id="{87DE6118-2437-4B30-8E3C-4D2BE6020583}" type="datetimeFigureOut">
               <a:rPr lang="en-US" smtClean="0"/>
-              <a:t>5/12/2022</a:t>
+              <a:t>5/14/2022</a:t>
             </a:fld>
             <a:endParaRPr lang="en-US"/>
           </a:p>
@@ -6903,7 +6904,7 @@
           <a:p>
             <a:fld id="{87DE6118-2437-4B30-8E3C-4D2BE6020583}" type="datetimeFigureOut">
               <a:rPr lang="en-US" smtClean="0"/>
-              <a:t>5/12/2022</a:t>
+              <a:t>5/14/2022</a:t>
             </a:fld>
             <a:endParaRPr lang="en-US"/>
           </a:p>
@@ -7318,7 +7319,7 @@
           <a:p>
             <a:fld id="{87DE6118-2437-4B30-8E3C-4D2BE6020583}" type="datetimeFigureOut">
               <a:rPr lang="en-US" smtClean="0"/>
-              <a:t>5/12/2022</a:t>
+              <a:t>5/14/2022</a:t>
             </a:fld>
             <a:endParaRPr lang="en-US"/>
           </a:p>
@@ -7460,7 +7461,7 @@
           <a:p>
             <a:fld id="{87DE6118-2437-4B30-8E3C-4D2BE6020583}" type="datetimeFigureOut">
               <a:rPr lang="en-US" smtClean="0"/>
-              <a:t>5/12/2022</a:t>
+              <a:t>5/14/2022</a:t>
             </a:fld>
             <a:endParaRPr lang="en-US"/>
           </a:p>
@@ -7573,7 +7574,7 @@
           <a:p>
             <a:fld id="{87DE6118-2437-4B30-8E3C-4D2BE6020583}" type="datetimeFigureOut">
               <a:rPr lang="en-US" smtClean="0"/>
-              <a:t>5/12/2022</a:t>
+              <a:t>5/14/2022</a:t>
             </a:fld>
             <a:endParaRPr lang="en-US"/>
           </a:p>
@@ -7887,7 +7888,7 @@
             <a:fld id="{87DE6118-2437-4B30-8E3C-4D2BE6020583}" type="datetimeFigureOut">
               <a:rPr lang="en-US" smtClean="0"/>
               <a:pPr/>
-              <a:t>5/12/2022</a:t>
+              <a:t>5/14/2022</a:t>
             </a:fld>
             <a:endParaRPr lang="en-US"/>
           </a:p>
@@ -8178,7 +8179,7 @@
             <a:fld id="{87DE6118-2437-4B30-8E3C-4D2BE6020583}" type="datetimeFigureOut">
               <a:rPr lang="en-US" smtClean="0"/>
               <a:pPr/>
-              <a:t>5/12/2022</a:t>
+              <a:t>5/14/2022</a:t>
             </a:fld>
             <a:endParaRPr lang="en-US"/>
           </a:p>
@@ -8423,7 +8424,7 @@
             <a:fld id="{87DE6118-2437-4B30-8E3C-4D2BE6020583}" type="datetimeFigureOut">
               <a:rPr lang="en-US" smtClean="0"/>
               <a:pPr/>
-              <a:t>5/12/2022</a:t>
+              <a:t>5/14/2022</a:t>
             </a:fld>
             <a:endParaRPr lang="en-US"/>
           </a:p>
@@ -9060,7 +9061,7 @@
             <a:fld id="{87DE6118-2437-4B30-8E3C-4D2BE6020583}" type="datetimeFigureOut">
               <a:rPr lang="en-US" smtClean="0"/>
               <a:pPr/>
-              <a:t>5/12/2022</a:t>
+              <a:t>5/14/2022</a:t>
             </a:fld>
             <a:endParaRPr lang="en-US"/>
           </a:p>
@@ -9706,7 +9707,7 @@
             <a:fld id="{87DE6118-2437-4B30-8E3C-4D2BE6020583}" type="datetimeFigureOut">
               <a:rPr lang="en-US" smtClean="0"/>
               <a:pPr/>
-              <a:t>5/12/2022</a:t>
+              <a:t>5/14/2022</a:t>
             </a:fld>
             <a:endParaRPr lang="en-US"/>
           </a:p>
@@ -27311,6 +27312,231 @@
 </p:sld>
 </file>
 
+<file path=ppt/slides/slide24.xml><?xml version="1.0" encoding="utf-8"?>
+<p:sld xmlns:a="http://schemas.openxmlformats.org/drawingml/2006/main" xmlns:r="http://schemas.openxmlformats.org/officeDocument/2006/relationships" xmlns:p="http://schemas.openxmlformats.org/presentationml/2006/main">
+  <p:cSld>
+    <p:bg>
+      <p:bgPr>
+        <a:pattFill prst="dotGrid">
+          <a:fgClr>
+            <a:schemeClr val="bg1">
+              <a:lumMod val="95000"/>
+            </a:schemeClr>
+          </a:fgClr>
+          <a:bgClr>
+            <a:schemeClr val="bg1"/>
+          </a:bgClr>
+        </a:pattFill>
+        <a:effectLst/>
+      </p:bgPr>
+    </p:bg>
+    <p:spTree>
+      <p:nvGrpSpPr>
+        <p:cNvPr id="1" name=""/>
+        <p:cNvGrpSpPr/>
+        <p:nvPr/>
+      </p:nvGrpSpPr>
+      <p:grpSpPr>
+        <a:xfrm>
+          <a:off x="0" y="0"/>
+          <a:ext cx="0" cy="0"/>
+          <a:chOff x="0" y="0"/>
+          <a:chExt cx="0" cy="0"/>
+        </a:xfrm>
+      </p:grpSpPr>
+      <p:sp>
+        <p:nvSpPr>
+          <p:cNvPr id="2" name="Title 1">
+            <a:extLst>
+              <a:ext uri="{FF2B5EF4-FFF2-40B4-BE49-F238E27FC236}">
+                <a16:creationId xmlns:a16="http://schemas.microsoft.com/office/drawing/2014/main" id="{1A0B78B4-2F1A-4972-85E6-ED9D13DA7EFF}"/>
+              </a:ext>
+            </a:extLst>
+          </p:cNvPr>
+          <p:cNvSpPr>
+            <a:spLocks noGrp="1"/>
+          </p:cNvSpPr>
+          <p:nvPr>
+            <p:ph type="title"/>
+          </p:nvPr>
+        </p:nvSpPr>
+        <p:spPr>
+          <a:xfrm>
+            <a:off x="838200" y="206429"/>
+            <a:ext cx="10515600" cy="670186"/>
+          </a:xfrm>
+        </p:spPr>
+        <p:txBody>
+          <a:bodyPr>
+            <a:normAutofit/>
+          </a:bodyPr>
+          <a:lstStyle/>
+          <a:p>
+            <a:pPr algn="ctr"/>
+            <a:r>
+              <a:rPr lang="en-US" sz="3600"/>
+              <a:t>Gestionarea comenzilor – users si staff</a:t>
+            </a:r>
+          </a:p>
+        </p:txBody>
+      </p:sp>
+      <p:sp>
+        <p:nvSpPr>
+          <p:cNvPr id="3" name="TextBox 2">
+            <a:extLst>
+              <a:ext uri="{FF2B5EF4-FFF2-40B4-BE49-F238E27FC236}">
+                <a16:creationId xmlns:a16="http://schemas.microsoft.com/office/drawing/2014/main" id="{D85A3F73-CB6E-433A-A0CE-4F2DE682EC08}"/>
+              </a:ext>
+            </a:extLst>
+          </p:cNvPr>
+          <p:cNvSpPr txBox="1"/>
+          <p:nvPr/>
+        </p:nvSpPr>
+        <p:spPr>
+          <a:xfrm>
+            <a:off x="396510" y="1084333"/>
+            <a:ext cx="5699490" cy="369332"/>
+          </a:xfrm>
+          <a:prstGeom prst="rect">
+            <a:avLst/>
+          </a:prstGeom>
+        </p:spPr>
+        <p:style>
+          <a:lnRef idx="2">
+            <a:schemeClr val="dk1">
+              <a:shade val="50000"/>
+            </a:schemeClr>
+          </a:lnRef>
+          <a:fillRef idx="1">
+            <a:schemeClr val="dk1"/>
+          </a:fillRef>
+          <a:effectRef idx="0">
+            <a:schemeClr val="dk1"/>
+          </a:effectRef>
+          <a:fontRef idx="minor">
+            <a:schemeClr val="lt1"/>
+          </a:fontRef>
+        </p:style>
+        <p:txBody>
+          <a:bodyPr wrap="square" rtlCol="0">
+            <a:spAutoFit/>
+          </a:bodyPr>
+          <a:lstStyle/>
+          <a:p>
+            <a:r>
+              <a:rPr lang="en-US"/>
+              <a:t>Vizualizarea comenzilor de catre utilizatori</a:t>
+            </a:r>
+          </a:p>
+        </p:txBody>
+      </p:sp>
+      <p:sp>
+        <p:nvSpPr>
+          <p:cNvPr id="4" name="TextBox 3">
+            <a:extLst>
+              <a:ext uri="{FF2B5EF4-FFF2-40B4-BE49-F238E27FC236}">
+                <a16:creationId xmlns:a16="http://schemas.microsoft.com/office/drawing/2014/main" id="{02E06904-D85E-4CF6-9D51-09EBE742BC44}"/>
+              </a:ext>
+            </a:extLst>
+          </p:cNvPr>
+          <p:cNvSpPr txBox="1"/>
+          <p:nvPr/>
+        </p:nvSpPr>
+        <p:spPr>
+          <a:xfrm>
+            <a:off x="396509" y="1828800"/>
+            <a:ext cx="9624105" cy="3262432"/>
+          </a:xfrm>
+          <a:prstGeom prst="rect">
+            <a:avLst/>
+          </a:prstGeom>
+          <a:noFill/>
+        </p:spPr>
+        <p:txBody>
+          <a:bodyPr wrap="square" rtlCol="0">
+            <a:spAutoFit/>
+          </a:bodyPr>
+          <a:lstStyle/>
+          <a:p>
+            <a:pPr marL="285750" indent="-285750">
+              <a:spcBef>
+                <a:spcPts val="2400"/>
+              </a:spcBef>
+              <a:buFont typeface="Wingdings" panose="05000000000000000000" pitchFamily="2" charset="2"/>
+              <a:buChar char="Ø"/>
+            </a:pPr>
+            <a:r>
+              <a:rPr lang="en-US"/>
+              <a:t>Vom afisa in setarile contului o pagina cu comenzile utilizatorului current</a:t>
+            </a:r>
+          </a:p>
+          <a:p>
+            <a:pPr marL="285750" indent="-285750">
+              <a:spcBef>
+                <a:spcPts val="2400"/>
+              </a:spcBef>
+              <a:buFont typeface="Wingdings" panose="05000000000000000000" pitchFamily="2" charset="2"/>
+              <a:buChar char="Ø"/>
+            </a:pPr>
+            <a:r>
+              <a:rPr lang="en-US"/>
+              <a:t>Vom afisa comenzile cu datele principale ale comenzii si statutul acesteia. Va trebui sa construim o functie care sa intoarca costurile comenzii – ale produselor si costul total si numarul de produse.</a:t>
+            </a:r>
+          </a:p>
+          <a:p>
+            <a:pPr marL="285750" indent="-285750">
+              <a:spcBef>
+                <a:spcPts val="2400"/>
+              </a:spcBef>
+              <a:buFont typeface="Wingdings" panose="05000000000000000000" pitchFamily="2" charset="2"/>
+              <a:buChar char="Ø"/>
+            </a:pPr>
+            <a:r>
+              <a:rPr lang="en-US"/>
+              <a:t>Vom afisa pentru fiecare comanda in parte detaliile comenzii, respectiv produsele comandate cu pret, cantitate, cost</a:t>
+            </a:r>
+          </a:p>
+          <a:p>
+            <a:pPr marL="285750" indent="-285750">
+              <a:spcBef>
+                <a:spcPts val="2400"/>
+              </a:spcBef>
+              <a:buFont typeface="Wingdings" panose="05000000000000000000" pitchFamily="2" charset="2"/>
+              <a:buChar char="Ø"/>
+            </a:pPr>
+            <a:r>
+              <a:rPr lang="en-US"/>
+              <a:t>Un utilizator va putea anula o comanda care inca nu este inca platita </a:t>
+            </a:r>
+          </a:p>
+          <a:p>
+            <a:pPr marL="285750" indent="-285750">
+              <a:spcBef>
+                <a:spcPts val="2400"/>
+              </a:spcBef>
+              <a:buFont typeface="Wingdings" panose="05000000000000000000" pitchFamily="2" charset="2"/>
+              <a:buChar char="Ø"/>
+            </a:pPr>
+            <a:r>
+              <a:rPr lang="en-US"/>
+              <a:t>Un utilizator va putea printa – afisa in format pdf orice comanda</a:t>
+            </a:r>
+          </a:p>
+        </p:txBody>
+      </p:sp>
+    </p:spTree>
+    <p:extLst>
+      <p:ext uri="{BB962C8B-B14F-4D97-AF65-F5344CB8AC3E}">
+        <p14:creationId xmlns:p14="http://schemas.microsoft.com/office/powerpoint/2010/main" val="825520949"/>
+      </p:ext>
+    </p:extLst>
+  </p:cSld>
+  <p:clrMapOvr>
+    <a:masterClrMapping/>
+  </p:clrMapOvr>
+</p:sld>
+</file>
+
 <file path=ppt/slides/slide3.xml><?xml version="1.0" encoding="utf-8"?>
 <p:sld xmlns:a="http://schemas.openxmlformats.org/drawingml/2006/main" xmlns:r="http://schemas.openxmlformats.org/officeDocument/2006/relationships" xmlns:p="http://schemas.openxmlformats.org/presentationml/2006/main">
   <p:cSld>

</xml_diff>